<commit_message>
updated CNN ANN & SVM Final Project CS 4662. Harish L April 27 2025
</commit_message>
<xml_diff>
--- a/Reports/CS 4662 Heart Failure Presentation.pptx
+++ b/Reports/CS 4662 Heart Failure Presentation.pptx
@@ -5,36 +5,30 @@
     <p:sldMasterId id="2147483659" r:id="rId1"/>
   </p:sldMasterIdLst>
   <p:notesMasterIdLst>
-    <p:notesMasterId r:id="rId13"/>
+    <p:notesMasterId r:id="rId14"/>
   </p:notesMasterIdLst>
   <p:sldIdLst>
     <p:sldId id="256" r:id="rId2"/>
     <p:sldId id="257" r:id="rId3"/>
     <p:sldId id="258" r:id="rId4"/>
     <p:sldId id="259" r:id="rId5"/>
-    <p:sldId id="265" r:id="rId6"/>
+    <p:sldId id="263" r:id="rId6"/>
     <p:sldId id="266" r:id="rId7"/>
-    <p:sldId id="260" r:id="rId8"/>
-    <p:sldId id="263" r:id="rId9"/>
-    <p:sldId id="264" r:id="rId10"/>
-    <p:sldId id="261" r:id="rId11"/>
-    <p:sldId id="262" r:id="rId12"/>
+    <p:sldId id="265" r:id="rId8"/>
+    <p:sldId id="267" r:id="rId9"/>
+    <p:sldId id="270" r:id="rId10"/>
+    <p:sldId id="268" r:id="rId11"/>
+    <p:sldId id="269" r:id="rId12"/>
+    <p:sldId id="262" r:id="rId13"/>
   </p:sldIdLst>
   <p:sldSz cx="9144000" cy="5143500" type="screen16x9"/>
   <p:notesSz cx="6858000" cy="9144000"/>
   <p:embeddedFontLst>
     <p:embeddedFont>
       <p:font typeface="Old Standard TT" panose="020B0604020202020204" charset="0"/>
-      <p:regular r:id="rId14"/>
-      <p:bold r:id="rId15"/>
-      <p:italic r:id="rId16"/>
-    </p:embeddedFont>
-    <p:embeddedFont>
-      <p:font typeface="Roboto" panose="02000000000000000000" pitchFamily="2" charset="0"/>
-      <p:regular r:id="rId17"/>
-      <p:bold r:id="rId18"/>
-      <p:italic r:id="rId19"/>
-      <p:boldItalic r:id="rId20"/>
+      <p:regular r:id="rId15"/>
+      <p:bold r:id="rId16"/>
+      <p:italic r:id="rId17"/>
     </p:embeddedFont>
   </p:embeddedFontLst>
   <p:defaultTextStyle>
@@ -1147,214 +1141,6 @@
   <p:cSld>
     <p:spTree>
       <p:nvGrpSpPr>
-        <p:cNvPr id="1" name="Shape 86"/>
-        <p:cNvGrpSpPr/>
-        <p:nvPr/>
-      </p:nvGrpSpPr>
-      <p:grpSpPr>
-        <a:xfrm>
-          <a:off x="0" y="0"/>
-          <a:ext cx="0" cy="0"/>
-          <a:chOff x="0" y="0"/>
-          <a:chExt cx="0" cy="0"/>
-        </a:xfrm>
-      </p:grpSpPr>
-      <p:sp>
-        <p:nvSpPr>
-          <p:cNvPr id="87" name="Google Shape;87;g31abbd24b0b_0_11:notes"/>
-          <p:cNvSpPr>
-            <a:spLocks noGrp="1" noRot="1" noChangeAspect="1"/>
-          </p:cNvSpPr>
-          <p:nvPr>
-            <p:ph type="sldImg" idx="2"/>
-          </p:nvPr>
-        </p:nvSpPr>
-        <p:spPr>
-          <a:xfrm>
-            <a:off x="381000" y="685800"/>
-            <a:ext cx="6096000" cy="3429000"/>
-          </a:xfrm>
-          <a:custGeom>
-            <a:avLst/>
-            <a:gdLst/>
-            <a:ahLst/>
-            <a:cxnLst/>
-            <a:rect l="l" t="t" r="r" b="b"/>
-            <a:pathLst>
-              <a:path w="120000" h="120000" extrusionOk="0">
-                <a:moveTo>
-                  <a:pt x="0" y="0"/>
-                </a:moveTo>
-                <a:lnTo>
-                  <a:pt x="120000" y="0"/>
-                </a:lnTo>
-                <a:lnTo>
-                  <a:pt x="120000" y="120000"/>
-                </a:lnTo>
-                <a:lnTo>
-                  <a:pt x="0" y="120000"/>
-                </a:lnTo>
-                <a:close/>
-              </a:path>
-            </a:pathLst>
-          </a:custGeom>
-        </p:spPr>
-      </p:sp>
-      <p:sp>
-        <p:nvSpPr>
-          <p:cNvPr id="88" name="Google Shape;88;g31abbd24b0b_0_11:notes"/>
-          <p:cNvSpPr txBox="1">
-            <a:spLocks noGrp="1"/>
-          </p:cNvSpPr>
-          <p:nvPr>
-            <p:ph type="body" idx="1"/>
-          </p:nvPr>
-        </p:nvSpPr>
-        <p:spPr>
-          <a:xfrm>
-            <a:off x="685800" y="4343400"/>
-            <a:ext cx="5486400" cy="4114800"/>
-          </a:xfrm>
-          <a:prstGeom prst="rect">
-            <a:avLst/>
-          </a:prstGeom>
-        </p:spPr>
-        <p:txBody>
-          <a:bodyPr spcFirstLastPara="1" wrap="square" lIns="91425" tIns="91425" rIns="91425" bIns="91425" anchor="t" anchorCtr="0">
-            <a:noAutofit/>
-          </a:bodyPr>
-          <a:lstStyle/>
-          <a:p>
-            <a:pPr marL="0" lvl="0" indent="0" algn="l" rtl="0">
-              <a:spcBef>
-                <a:spcPts val="0"/>
-              </a:spcBef>
-              <a:spcAft>
-                <a:spcPts val="0"/>
-              </a:spcAft>
-              <a:buNone/>
-            </a:pPr>
-            <a:endParaRPr/>
-          </a:p>
-        </p:txBody>
-      </p:sp>
-    </p:spTree>
-  </p:cSld>
-  <p:clrMapOvr>
-    <a:masterClrMapping/>
-  </p:clrMapOvr>
-</p:notes>
-</file>
-
-<file path=ppt/notesSlides/notesSlide6.xml><?xml version="1.0" encoding="utf-8"?>
-<p:notes xmlns:a="http://schemas.openxmlformats.org/drawingml/2006/main" xmlns:r="http://schemas.openxmlformats.org/officeDocument/2006/relationships" xmlns:p="http://schemas.openxmlformats.org/presentationml/2006/main" showMasterSp="0" showMasterPhAnim="0">
-  <p:cSld>
-    <p:spTree>
-      <p:nvGrpSpPr>
-        <p:cNvPr id="1" name="Shape 94"/>
-        <p:cNvGrpSpPr/>
-        <p:nvPr/>
-      </p:nvGrpSpPr>
-      <p:grpSpPr>
-        <a:xfrm>
-          <a:off x="0" y="0"/>
-          <a:ext cx="0" cy="0"/>
-          <a:chOff x="0" y="0"/>
-          <a:chExt cx="0" cy="0"/>
-        </a:xfrm>
-      </p:grpSpPr>
-      <p:sp>
-        <p:nvSpPr>
-          <p:cNvPr id="95" name="Google Shape;95;g31c7fec79b7_0_0:notes"/>
-          <p:cNvSpPr>
-            <a:spLocks noGrp="1" noRot="1" noChangeAspect="1"/>
-          </p:cNvSpPr>
-          <p:nvPr>
-            <p:ph type="sldImg" idx="2"/>
-          </p:nvPr>
-        </p:nvSpPr>
-        <p:spPr>
-          <a:xfrm>
-            <a:off x="381300" y="685800"/>
-            <a:ext cx="6096000" cy="3429000"/>
-          </a:xfrm>
-          <a:custGeom>
-            <a:avLst/>
-            <a:gdLst/>
-            <a:ahLst/>
-            <a:cxnLst/>
-            <a:rect l="l" t="t" r="r" b="b"/>
-            <a:pathLst>
-              <a:path w="120000" h="120000" extrusionOk="0">
-                <a:moveTo>
-                  <a:pt x="0" y="0"/>
-                </a:moveTo>
-                <a:lnTo>
-                  <a:pt x="120000" y="0"/>
-                </a:lnTo>
-                <a:lnTo>
-                  <a:pt x="120000" y="120000"/>
-                </a:lnTo>
-                <a:lnTo>
-                  <a:pt x="0" y="120000"/>
-                </a:lnTo>
-                <a:close/>
-              </a:path>
-            </a:pathLst>
-          </a:custGeom>
-        </p:spPr>
-      </p:sp>
-      <p:sp>
-        <p:nvSpPr>
-          <p:cNvPr id="96" name="Google Shape;96;g31c7fec79b7_0_0:notes"/>
-          <p:cNvSpPr txBox="1">
-            <a:spLocks noGrp="1"/>
-          </p:cNvSpPr>
-          <p:nvPr>
-            <p:ph type="body" idx="1"/>
-          </p:nvPr>
-        </p:nvSpPr>
-        <p:spPr>
-          <a:xfrm>
-            <a:off x="685800" y="4343400"/>
-            <a:ext cx="5486400" cy="4114800"/>
-          </a:xfrm>
-          <a:prstGeom prst="rect">
-            <a:avLst/>
-          </a:prstGeom>
-        </p:spPr>
-        <p:txBody>
-          <a:bodyPr spcFirstLastPara="1" wrap="square" lIns="91425" tIns="91425" rIns="91425" bIns="91425" anchor="t" anchorCtr="0">
-            <a:noAutofit/>
-          </a:bodyPr>
-          <a:lstStyle/>
-          <a:p>
-            <a:pPr marL="0" lvl="0" indent="0" algn="l" rtl="0">
-              <a:spcBef>
-                <a:spcPts val="0"/>
-              </a:spcBef>
-              <a:spcAft>
-                <a:spcPts val="0"/>
-              </a:spcAft>
-              <a:buNone/>
-            </a:pPr>
-            <a:endParaRPr/>
-          </a:p>
-        </p:txBody>
-      </p:sp>
-    </p:spTree>
-  </p:cSld>
-  <p:clrMapOvr>
-    <a:masterClrMapping/>
-  </p:clrMapOvr>
-</p:notes>
-</file>
-
-<file path=ppt/notesSlides/notesSlide7.xml><?xml version="1.0" encoding="utf-8"?>
-<p:notes xmlns:a="http://schemas.openxmlformats.org/drawingml/2006/main" xmlns:r="http://schemas.openxmlformats.org/officeDocument/2006/relationships" xmlns:p="http://schemas.openxmlformats.org/presentationml/2006/main" showMasterSp="0" showMasterPhAnim="0">
-  <p:cSld>
-    <p:spTree>
-      <p:nvGrpSpPr>
         <p:cNvPr id="1" name="Shape 127"/>
         <p:cNvGrpSpPr/>
         <p:nvPr/>
@@ -1379,7 +1165,7 @@
         </p:nvSpPr>
         <p:spPr>
           <a:xfrm>
-            <a:off x="381300" y="685800"/>
+            <a:off x="381000" y="685800"/>
             <a:ext cx="6096000" cy="3429000"/>
           </a:xfrm>
           <a:custGeom>
@@ -2359,110 +2145,6 @@
       <p:sp>
         <p:nvSpPr>
           <p:cNvPr id="52" name="Google Shape;52;p11"/>
-          <p:cNvSpPr txBox="1">
-            <a:spLocks noGrp="1"/>
-          </p:cNvSpPr>
-          <p:nvPr>
-            <p:ph type="sldNum" idx="12"/>
-          </p:nvPr>
-        </p:nvSpPr>
-        <p:spPr>
-          <a:xfrm>
-            <a:off x="8472458" y="4663217"/>
-            <a:ext cx="548700" cy="393600"/>
-          </a:xfrm>
-          <a:prstGeom prst="rect">
-            <a:avLst/>
-          </a:prstGeom>
-        </p:spPr>
-        <p:txBody>
-          <a:bodyPr spcFirstLastPara="1" wrap="square" lIns="91425" tIns="91425" rIns="91425" bIns="91425" anchor="ctr" anchorCtr="0">
-            <a:normAutofit/>
-          </a:bodyPr>
-          <a:lstStyle>
-            <a:lvl1pPr lvl="0">
-              <a:buNone/>
-              <a:defRPr/>
-            </a:lvl1pPr>
-            <a:lvl2pPr lvl="1">
-              <a:buNone/>
-              <a:defRPr/>
-            </a:lvl2pPr>
-            <a:lvl3pPr lvl="2">
-              <a:buNone/>
-              <a:defRPr/>
-            </a:lvl3pPr>
-            <a:lvl4pPr lvl="3">
-              <a:buNone/>
-              <a:defRPr/>
-            </a:lvl4pPr>
-            <a:lvl5pPr lvl="4">
-              <a:buNone/>
-              <a:defRPr/>
-            </a:lvl5pPr>
-            <a:lvl6pPr lvl="5">
-              <a:buNone/>
-              <a:defRPr/>
-            </a:lvl6pPr>
-            <a:lvl7pPr lvl="6">
-              <a:buNone/>
-              <a:defRPr/>
-            </a:lvl7pPr>
-            <a:lvl8pPr lvl="7">
-              <a:buNone/>
-              <a:defRPr/>
-            </a:lvl8pPr>
-            <a:lvl9pPr lvl="8">
-              <a:buNone/>
-              <a:defRPr/>
-            </a:lvl9pPr>
-          </a:lstStyle>
-          <a:p>
-            <a:pPr marL="0" lvl="0" indent="0" algn="r" rtl="0">
-              <a:spcBef>
-                <a:spcPts val="0"/>
-              </a:spcBef>
-              <a:spcAft>
-                <a:spcPts val="0"/>
-              </a:spcAft>
-              <a:buNone/>
-            </a:pPr>
-            <a:fld id="{00000000-1234-1234-1234-123412341234}" type="slidenum">
-              <a:rPr lang="en"/>
-              <a:t>‹#›</a:t>
-            </a:fld>
-            <a:endParaRPr/>
-          </a:p>
-        </p:txBody>
-      </p:sp>
-    </p:spTree>
-  </p:cSld>
-  <p:clrMapOvr>
-    <a:masterClrMapping/>
-  </p:clrMapOvr>
-</p:sldLayout>
-</file>
-
-<file path=ppt/slideLayouts/slideLayout11.xml><?xml version="1.0" encoding="utf-8"?>
-<p:sldLayout xmlns:a="http://schemas.openxmlformats.org/drawingml/2006/main" xmlns:r="http://schemas.openxmlformats.org/officeDocument/2006/relationships" xmlns:p="http://schemas.openxmlformats.org/presentationml/2006/main" matchingName="Blank" type="blank">
-  <p:cSld name="BLANK">
-    <p:spTree>
-      <p:nvGrpSpPr>
-        <p:cNvPr id="1" name="Shape 53"/>
-        <p:cNvGrpSpPr/>
-        <p:nvPr/>
-      </p:nvGrpSpPr>
-      <p:grpSpPr>
-        <a:xfrm>
-          <a:off x="0" y="0"/>
-          <a:ext cx="0" cy="0"/>
-          <a:chOff x="0" y="0"/>
-          <a:chExt cx="0" cy="0"/>
-        </a:xfrm>
-      </p:grpSpPr>
-      <p:sp>
-        <p:nvSpPr>
-          <p:cNvPr id="54" name="Google Shape;54;p12"/>
           <p:cNvSpPr txBox="1">
             <a:spLocks noGrp="1"/>
           </p:cNvSpPr>
@@ -6338,7 +6020,6 @@
     <p:sldLayoutId id="2147483655" r:id="rId8"/>
     <p:sldLayoutId id="2147483656" r:id="rId9"/>
     <p:sldLayoutId id="2147483657" r:id="rId10"/>
-    <p:sldLayoutId id="2147483658" r:id="rId11"/>
   </p:sldLayoutIdLst>
   <p:hf sldNum="0" hdr="0" ftr="0" dt="0"/>
   <p:txStyles>
@@ -7175,7 +6856,7 @@
   <p:cSld>
     <p:spTree>
       <p:nvGrpSpPr>
-        <p:cNvPr id="1" name="Shape 97"/>
+        <p:cNvPr id="1" name=""/>
         <p:cNvGrpSpPr/>
         <p:nvPr/>
       </p:nvGrpSpPr>
@@ -7187,1313 +6868,167 @@
           <a:chExt cx="0" cy="0"/>
         </a:xfrm>
       </p:grpSpPr>
-      <p:grpSp>
-        <p:nvGrpSpPr>
-          <p:cNvPr id="98" name="Google Shape;98;p18"/>
-          <p:cNvGrpSpPr/>
-          <p:nvPr/>
-        </p:nvGrpSpPr>
-        <p:grpSpPr>
-          <a:xfrm>
-            <a:off x="1087525" y="1574025"/>
-            <a:ext cx="1834900" cy="2315200"/>
-            <a:chOff x="1083025" y="1574025"/>
-            <a:chExt cx="1834900" cy="2315200"/>
-          </a:xfrm>
-        </p:grpSpPr>
-        <p:sp>
-          <p:nvSpPr>
-            <p:cNvPr id="99" name="Google Shape;99;p18"/>
-            <p:cNvSpPr txBox="1"/>
-            <p:nvPr/>
-          </p:nvSpPr>
-          <p:spPr>
-            <a:xfrm>
-              <a:off x="1336950" y="1574025"/>
-              <a:ext cx="891600" cy="241200"/>
-            </a:xfrm>
-            <a:prstGeom prst="rect">
-              <a:avLst/>
-            </a:prstGeom>
-            <a:noFill/>
-            <a:ln>
-              <a:noFill/>
-            </a:ln>
-          </p:spPr>
-          <p:txBody>
-            <a:bodyPr spcFirstLastPara="1" wrap="square" lIns="91425" tIns="91425" rIns="91425" bIns="91425" anchor="t" anchorCtr="0">
-              <a:noAutofit/>
-            </a:bodyPr>
-            <a:lstStyle/>
-            <a:p>
-              <a:pPr marL="0" lvl="0" indent="0" algn="r" rtl="0">
-                <a:lnSpc>
-                  <a:spcPct val="115000"/>
-                </a:lnSpc>
-                <a:spcBef>
-                  <a:spcPts val="0"/>
-                </a:spcBef>
-                <a:spcAft>
-                  <a:spcPts val="1600"/>
-                </a:spcAft>
-                <a:buNone/>
-              </a:pPr>
-              <a:r>
-                <a:rPr lang="en" sz="800">
-                  <a:solidFill>
-                    <a:srgbClr val="0C57D3"/>
-                  </a:solidFill>
-                  <a:latin typeface="Roboto"/>
-                  <a:ea typeface="Roboto"/>
-                  <a:cs typeface="Roboto"/>
-                  <a:sym typeface="Roboto"/>
-                </a:rPr>
-                <a:t>September 10</a:t>
-              </a:r>
-              <a:endParaRPr sz="800">
-                <a:solidFill>
-                  <a:srgbClr val="0C57D3"/>
-                </a:solidFill>
-                <a:latin typeface="Roboto"/>
-                <a:ea typeface="Roboto"/>
-                <a:cs typeface="Roboto"/>
-                <a:sym typeface="Roboto"/>
-              </a:endParaRPr>
-            </a:p>
-          </p:txBody>
-        </p:sp>
-        <p:sp>
-          <p:nvSpPr>
-            <p:cNvPr id="100" name="Google Shape;100;p18"/>
-            <p:cNvSpPr txBox="1"/>
-            <p:nvPr/>
-          </p:nvSpPr>
-          <p:spPr>
-            <a:xfrm>
-              <a:off x="1235825" y="2695025"/>
-              <a:ext cx="1505100" cy="446400"/>
-            </a:xfrm>
-            <a:prstGeom prst="rect">
-              <a:avLst/>
-            </a:prstGeom>
-            <a:noFill/>
-            <a:ln>
-              <a:noFill/>
-            </a:ln>
-          </p:spPr>
-          <p:txBody>
-            <a:bodyPr spcFirstLastPara="1" wrap="square" lIns="91425" tIns="91425" rIns="91425" bIns="91425" anchor="b" anchorCtr="0">
-              <a:noAutofit/>
-            </a:bodyPr>
-            <a:lstStyle/>
-            <a:p>
-              <a:pPr marL="0" lvl="0" indent="0" algn="l" rtl="0">
-                <a:lnSpc>
-                  <a:spcPct val="115000"/>
-                </a:lnSpc>
-                <a:spcBef>
-                  <a:spcPts val="0"/>
-                </a:spcBef>
-                <a:spcAft>
-                  <a:spcPts val="0"/>
-                </a:spcAft>
-                <a:buNone/>
-              </a:pPr>
-              <a:r>
-                <a:rPr lang="en" sz="1000" b="1">
-                  <a:solidFill>
-                    <a:srgbClr val="0C57D3"/>
-                  </a:solidFill>
-                  <a:latin typeface="Roboto"/>
-                  <a:ea typeface="Roboto"/>
-                  <a:cs typeface="Roboto"/>
-                  <a:sym typeface="Roboto"/>
-                </a:rPr>
-                <a:t>Meeting 1</a:t>
-              </a:r>
-              <a:endParaRPr sz="1000" b="1">
-                <a:solidFill>
-                  <a:srgbClr val="0C57D3"/>
-                </a:solidFill>
-                <a:latin typeface="Roboto"/>
-                <a:ea typeface="Roboto"/>
-                <a:cs typeface="Roboto"/>
-                <a:sym typeface="Roboto"/>
-              </a:endParaRPr>
-            </a:p>
-          </p:txBody>
-        </p:sp>
-        <p:sp>
-          <p:nvSpPr>
-            <p:cNvPr id="101" name="Google Shape;101;p18"/>
-            <p:cNvSpPr txBox="1"/>
-            <p:nvPr/>
-          </p:nvSpPr>
-          <p:spPr>
-            <a:xfrm>
-              <a:off x="1215700" y="3151825"/>
-              <a:ext cx="1545600" cy="737400"/>
-            </a:xfrm>
-            <a:prstGeom prst="rect">
-              <a:avLst/>
-            </a:prstGeom>
-            <a:noFill/>
-            <a:ln>
-              <a:noFill/>
-            </a:ln>
-          </p:spPr>
-          <p:txBody>
-            <a:bodyPr spcFirstLastPara="1" wrap="square" lIns="91425" tIns="91425" rIns="91425" bIns="91425" anchor="t" anchorCtr="0">
-              <a:noAutofit/>
-            </a:bodyPr>
-            <a:lstStyle/>
-            <a:p>
-              <a:pPr marL="0" lvl="0" indent="0" algn="l" rtl="0">
-                <a:lnSpc>
-                  <a:spcPct val="115000"/>
-                </a:lnSpc>
-                <a:spcBef>
-                  <a:spcPts val="0"/>
-                </a:spcBef>
-                <a:spcAft>
-                  <a:spcPts val="1600"/>
-                </a:spcAft>
-                <a:buNone/>
-              </a:pPr>
-              <a:r>
-                <a:rPr lang="en" sz="800">
-                  <a:solidFill>
-                    <a:srgbClr val="0C57D3"/>
-                  </a:solidFill>
-                  <a:latin typeface="Roboto"/>
-                  <a:ea typeface="Roboto"/>
-                  <a:cs typeface="Roboto"/>
-                  <a:sym typeface="Roboto"/>
-                </a:rPr>
-                <a:t>Met with the TA to deliver our project proposal.</a:t>
-              </a:r>
-              <a:endParaRPr sz="800">
-                <a:solidFill>
-                  <a:srgbClr val="0C57D3"/>
-                </a:solidFill>
-                <a:latin typeface="Roboto"/>
-                <a:ea typeface="Roboto"/>
-                <a:cs typeface="Roboto"/>
-                <a:sym typeface="Roboto"/>
-              </a:endParaRPr>
-            </a:p>
-          </p:txBody>
-        </p:sp>
-        <p:cxnSp>
-          <p:nvCxnSpPr>
-            <p:cNvPr id="102" name="Google Shape;102;p18"/>
-            <p:cNvCxnSpPr/>
-            <p:nvPr/>
-          </p:nvCxnSpPr>
-          <p:spPr>
-            <a:xfrm>
-              <a:off x="2180202" y="1695421"/>
-              <a:ext cx="718500" cy="741900"/>
-            </a:xfrm>
-            <a:prstGeom prst="straightConnector1">
-              <a:avLst/>
-            </a:prstGeom>
-            <a:noFill/>
-            <a:ln w="9525" cap="flat" cmpd="sng">
-              <a:solidFill>
-                <a:srgbClr val="0D5CDF"/>
-              </a:solidFill>
-              <a:prstDash val="solid"/>
-              <a:round/>
-              <a:headEnd type="none" w="sm" len="sm"/>
-              <a:tailEnd type="none" w="sm" len="sm"/>
-            </a:ln>
-          </p:spPr>
-        </p:cxnSp>
-        <p:sp>
-          <p:nvSpPr>
-            <p:cNvPr id="103" name="Google Shape;103;p18"/>
-            <p:cNvSpPr/>
-            <p:nvPr/>
-          </p:nvSpPr>
-          <p:spPr>
-            <a:xfrm flipH="1">
-              <a:off x="1083025" y="2306625"/>
-              <a:ext cx="1834800" cy="143400"/>
-            </a:xfrm>
-            <a:prstGeom prst="parallelogram">
-              <a:avLst>
-                <a:gd name="adj" fmla="val 96952"/>
-              </a:avLst>
-            </a:prstGeom>
-            <a:solidFill>
-              <a:srgbClr val="0D5CDF"/>
-            </a:solidFill>
-            <a:ln>
-              <a:noFill/>
-            </a:ln>
-          </p:spPr>
-          <p:txBody>
-            <a:bodyPr spcFirstLastPara="1" wrap="square" lIns="91425" tIns="91425" rIns="91425" bIns="91425" anchor="ctr" anchorCtr="0">
-              <a:noAutofit/>
-            </a:bodyPr>
-            <a:lstStyle/>
-            <a:p>
-              <a:pPr marL="0" lvl="0" indent="0" algn="l" rtl="0">
-                <a:spcBef>
-                  <a:spcPts val="0"/>
-                </a:spcBef>
-                <a:spcAft>
-                  <a:spcPts val="0"/>
-                </a:spcAft>
-                <a:buNone/>
-              </a:pPr>
-              <a:r>
-                <a:rPr lang="en"/>
-                <a:t>  </a:t>
-              </a:r>
-              <a:endParaRPr/>
-            </a:p>
-          </p:txBody>
-        </p:sp>
-        <p:sp>
-          <p:nvSpPr>
-            <p:cNvPr id="104" name="Google Shape;104;p18"/>
-            <p:cNvSpPr/>
-            <p:nvPr/>
-          </p:nvSpPr>
-          <p:spPr>
-            <a:xfrm>
-              <a:off x="1083125" y="2460449"/>
-              <a:ext cx="1834800" cy="143400"/>
-            </a:xfrm>
-            <a:prstGeom prst="parallelogram">
-              <a:avLst>
-                <a:gd name="adj" fmla="val 96952"/>
-              </a:avLst>
-            </a:prstGeom>
-            <a:solidFill>
-              <a:srgbClr val="0942A1"/>
-            </a:solidFill>
-            <a:ln>
-              <a:noFill/>
-            </a:ln>
-          </p:spPr>
-          <p:txBody>
-            <a:bodyPr spcFirstLastPara="1" wrap="square" lIns="91425" tIns="91425" rIns="91425" bIns="91425" anchor="ctr" anchorCtr="0">
-              <a:noAutofit/>
-            </a:bodyPr>
-            <a:lstStyle/>
-            <a:p>
-              <a:pPr marL="0" lvl="0" indent="0" algn="l" rtl="0">
-                <a:spcBef>
-                  <a:spcPts val="0"/>
-                </a:spcBef>
-                <a:spcAft>
-                  <a:spcPts val="0"/>
-                </a:spcAft>
-                <a:buNone/>
-              </a:pPr>
-              <a:endParaRPr/>
-            </a:p>
-          </p:txBody>
-        </p:sp>
-      </p:grpSp>
-      <p:grpSp>
-        <p:nvGrpSpPr>
-          <p:cNvPr id="105" name="Google Shape;105;p18"/>
-          <p:cNvGrpSpPr/>
-          <p:nvPr/>
-        </p:nvGrpSpPr>
-        <p:grpSpPr>
-          <a:xfrm>
-            <a:off x="2796474" y="1574025"/>
-            <a:ext cx="1834900" cy="2315200"/>
-            <a:chOff x="1083025" y="1574025"/>
-            <a:chExt cx="1834900" cy="2315200"/>
-          </a:xfrm>
-        </p:grpSpPr>
-        <p:sp>
-          <p:nvSpPr>
-            <p:cNvPr id="106" name="Google Shape;106;p18"/>
-            <p:cNvSpPr txBox="1"/>
-            <p:nvPr/>
-          </p:nvSpPr>
-          <p:spPr>
-            <a:xfrm>
-              <a:off x="1352727" y="1574025"/>
-              <a:ext cx="876000" cy="241200"/>
-            </a:xfrm>
-            <a:prstGeom prst="rect">
-              <a:avLst/>
-            </a:prstGeom>
-            <a:noFill/>
-            <a:ln>
-              <a:noFill/>
-            </a:ln>
-          </p:spPr>
-          <p:txBody>
-            <a:bodyPr spcFirstLastPara="1" wrap="square" lIns="91425" tIns="91425" rIns="91425" bIns="91425" anchor="t" anchorCtr="0">
-              <a:noAutofit/>
-            </a:bodyPr>
-            <a:lstStyle/>
-            <a:p>
-              <a:pPr marL="0" lvl="0" indent="0" algn="r" rtl="0">
-                <a:lnSpc>
-                  <a:spcPct val="115000"/>
-                </a:lnSpc>
-                <a:spcBef>
-                  <a:spcPts val="0"/>
-                </a:spcBef>
-                <a:spcAft>
-                  <a:spcPts val="1600"/>
-                </a:spcAft>
-                <a:buNone/>
-              </a:pPr>
-              <a:r>
-                <a:rPr lang="en" sz="800">
-                  <a:solidFill>
-                    <a:srgbClr val="0C57D3"/>
-                  </a:solidFill>
-                  <a:latin typeface="Roboto"/>
-                  <a:ea typeface="Roboto"/>
-                  <a:cs typeface="Roboto"/>
-                  <a:sym typeface="Roboto"/>
-                </a:rPr>
-                <a:t>October 16/20</a:t>
-              </a:r>
-              <a:endParaRPr sz="800">
-                <a:solidFill>
-                  <a:srgbClr val="0C57D3"/>
-                </a:solidFill>
-                <a:latin typeface="Roboto"/>
-                <a:ea typeface="Roboto"/>
-                <a:cs typeface="Roboto"/>
-                <a:sym typeface="Roboto"/>
-              </a:endParaRPr>
-            </a:p>
-          </p:txBody>
-        </p:sp>
-        <p:sp>
-          <p:nvSpPr>
-            <p:cNvPr id="107" name="Google Shape;107;p18"/>
-            <p:cNvSpPr txBox="1"/>
-            <p:nvPr/>
-          </p:nvSpPr>
-          <p:spPr>
-            <a:xfrm>
-              <a:off x="1235825" y="2695025"/>
-              <a:ext cx="1505100" cy="446400"/>
-            </a:xfrm>
-            <a:prstGeom prst="rect">
-              <a:avLst/>
-            </a:prstGeom>
-            <a:noFill/>
-            <a:ln>
-              <a:noFill/>
-            </a:ln>
-          </p:spPr>
-          <p:txBody>
-            <a:bodyPr spcFirstLastPara="1" wrap="square" lIns="91425" tIns="91425" rIns="91425" bIns="91425" anchor="b" anchorCtr="0">
-              <a:noAutofit/>
-            </a:bodyPr>
-            <a:lstStyle/>
-            <a:p>
-              <a:pPr marL="0" lvl="0" indent="0" algn="l" rtl="0">
-                <a:lnSpc>
-                  <a:spcPct val="115000"/>
-                </a:lnSpc>
-                <a:spcBef>
-                  <a:spcPts val="0"/>
-                </a:spcBef>
-                <a:spcAft>
-                  <a:spcPts val="0"/>
-                </a:spcAft>
-                <a:buNone/>
-              </a:pPr>
-              <a:r>
-                <a:rPr lang="en" sz="1000" b="1">
-                  <a:solidFill>
-                    <a:srgbClr val="0C57D3"/>
-                  </a:solidFill>
-                  <a:latin typeface="Roboto"/>
-                  <a:ea typeface="Roboto"/>
-                  <a:cs typeface="Roboto"/>
-                  <a:sym typeface="Roboto"/>
-                </a:rPr>
-                <a:t>Meeting 2/3</a:t>
-              </a:r>
-              <a:endParaRPr sz="1000" b="1">
-                <a:solidFill>
-                  <a:srgbClr val="0C57D3"/>
-                </a:solidFill>
-                <a:latin typeface="Roboto"/>
-                <a:ea typeface="Roboto"/>
-                <a:cs typeface="Roboto"/>
-                <a:sym typeface="Roboto"/>
-              </a:endParaRPr>
-            </a:p>
-          </p:txBody>
-        </p:sp>
-        <p:sp>
-          <p:nvSpPr>
-            <p:cNvPr id="108" name="Google Shape;108;p18"/>
-            <p:cNvSpPr txBox="1"/>
-            <p:nvPr/>
-          </p:nvSpPr>
-          <p:spPr>
-            <a:xfrm>
-              <a:off x="1215700" y="3151825"/>
-              <a:ext cx="1545600" cy="737400"/>
-            </a:xfrm>
-            <a:prstGeom prst="rect">
-              <a:avLst/>
-            </a:prstGeom>
-            <a:noFill/>
-            <a:ln>
-              <a:noFill/>
-            </a:ln>
-          </p:spPr>
-          <p:txBody>
-            <a:bodyPr spcFirstLastPara="1" wrap="square" lIns="91425" tIns="91425" rIns="91425" bIns="91425" anchor="t" anchorCtr="0">
-              <a:noAutofit/>
-            </a:bodyPr>
-            <a:lstStyle/>
-            <a:p>
-              <a:pPr marL="0" lvl="0" indent="0" algn="l" rtl="0">
-                <a:lnSpc>
-                  <a:spcPct val="115000"/>
-                </a:lnSpc>
-                <a:spcBef>
-                  <a:spcPts val="0"/>
-                </a:spcBef>
-                <a:spcAft>
-                  <a:spcPts val="1600"/>
-                </a:spcAft>
-                <a:buNone/>
-              </a:pPr>
-              <a:r>
-                <a:rPr lang="en" sz="800">
-                  <a:solidFill>
-                    <a:srgbClr val="0C57D3"/>
-                  </a:solidFill>
-                  <a:latin typeface="Roboto"/>
-                  <a:ea typeface="Roboto"/>
-                  <a:cs typeface="Roboto"/>
-                  <a:sym typeface="Roboto"/>
-                </a:rPr>
-                <a:t>Came together to discuss  how to divide up the work as well as finalize a clear direction for the project</a:t>
-              </a:r>
-              <a:endParaRPr sz="800">
-                <a:solidFill>
-                  <a:srgbClr val="0C57D3"/>
-                </a:solidFill>
-                <a:latin typeface="Roboto"/>
-                <a:ea typeface="Roboto"/>
-                <a:cs typeface="Roboto"/>
-                <a:sym typeface="Roboto"/>
-              </a:endParaRPr>
-            </a:p>
-          </p:txBody>
-        </p:sp>
-        <p:cxnSp>
-          <p:nvCxnSpPr>
-            <p:cNvPr id="109" name="Google Shape;109;p18"/>
-            <p:cNvCxnSpPr/>
-            <p:nvPr/>
-          </p:nvCxnSpPr>
-          <p:spPr>
-            <a:xfrm>
-              <a:off x="2180202" y="1695421"/>
-              <a:ext cx="718500" cy="741900"/>
-            </a:xfrm>
-            <a:prstGeom prst="straightConnector1">
-              <a:avLst/>
-            </a:prstGeom>
-            <a:noFill/>
-            <a:ln w="9525" cap="flat" cmpd="sng">
-              <a:solidFill>
-                <a:srgbClr val="0D5CDF"/>
-              </a:solidFill>
-              <a:prstDash val="solid"/>
-              <a:round/>
-              <a:headEnd type="none" w="sm" len="sm"/>
-              <a:tailEnd type="none" w="sm" len="sm"/>
-            </a:ln>
-          </p:spPr>
-        </p:cxnSp>
-        <p:sp>
-          <p:nvSpPr>
-            <p:cNvPr id="110" name="Google Shape;110;p18"/>
-            <p:cNvSpPr/>
-            <p:nvPr/>
-          </p:nvSpPr>
-          <p:spPr>
-            <a:xfrm flipH="1">
-              <a:off x="1083025" y="2306625"/>
-              <a:ext cx="1834800" cy="143400"/>
-            </a:xfrm>
-            <a:prstGeom prst="parallelogram">
-              <a:avLst>
-                <a:gd name="adj" fmla="val 96952"/>
-              </a:avLst>
-            </a:prstGeom>
-            <a:solidFill>
-              <a:srgbClr val="0D5CDF"/>
-            </a:solidFill>
-            <a:ln>
-              <a:noFill/>
-            </a:ln>
-          </p:spPr>
-          <p:txBody>
-            <a:bodyPr spcFirstLastPara="1" wrap="square" lIns="91425" tIns="91425" rIns="91425" bIns="91425" anchor="ctr" anchorCtr="0">
-              <a:noAutofit/>
-            </a:bodyPr>
-            <a:lstStyle/>
-            <a:p>
-              <a:pPr marL="0" lvl="0" indent="0" algn="l" rtl="0">
-                <a:spcBef>
-                  <a:spcPts val="0"/>
-                </a:spcBef>
-                <a:spcAft>
-                  <a:spcPts val="0"/>
-                </a:spcAft>
-                <a:buNone/>
-              </a:pPr>
-              <a:r>
-                <a:rPr lang="en"/>
-                <a:t>  </a:t>
-              </a:r>
-              <a:endParaRPr/>
-            </a:p>
-          </p:txBody>
-        </p:sp>
-        <p:sp>
-          <p:nvSpPr>
-            <p:cNvPr id="111" name="Google Shape;111;p18"/>
-            <p:cNvSpPr/>
-            <p:nvPr/>
-          </p:nvSpPr>
-          <p:spPr>
-            <a:xfrm>
-              <a:off x="1083125" y="2460449"/>
-              <a:ext cx="1834800" cy="143400"/>
-            </a:xfrm>
-            <a:prstGeom prst="parallelogram">
-              <a:avLst>
-                <a:gd name="adj" fmla="val 96952"/>
-              </a:avLst>
-            </a:prstGeom>
-            <a:solidFill>
-              <a:srgbClr val="0942A1"/>
-            </a:solidFill>
-            <a:ln>
-              <a:noFill/>
-            </a:ln>
-          </p:spPr>
-          <p:txBody>
-            <a:bodyPr spcFirstLastPara="1" wrap="square" lIns="91425" tIns="91425" rIns="91425" bIns="91425" anchor="ctr" anchorCtr="0">
-              <a:noAutofit/>
-            </a:bodyPr>
-            <a:lstStyle/>
-            <a:p>
-              <a:pPr marL="0" lvl="0" indent="0" algn="l" rtl="0">
-                <a:spcBef>
-                  <a:spcPts val="0"/>
-                </a:spcBef>
-                <a:spcAft>
-                  <a:spcPts val="0"/>
-                </a:spcAft>
-                <a:buNone/>
-              </a:pPr>
-              <a:endParaRPr/>
-            </a:p>
-          </p:txBody>
-        </p:sp>
-      </p:grpSp>
-      <p:grpSp>
-        <p:nvGrpSpPr>
-          <p:cNvPr id="112" name="Google Shape;112;p18"/>
-          <p:cNvGrpSpPr/>
-          <p:nvPr/>
-        </p:nvGrpSpPr>
-        <p:grpSpPr>
-          <a:xfrm>
-            <a:off x="4508319" y="1573325"/>
-            <a:ext cx="1834900" cy="2315189"/>
-            <a:chOff x="1083025" y="1574036"/>
-            <a:chExt cx="1834900" cy="2315189"/>
-          </a:xfrm>
-        </p:grpSpPr>
-        <p:sp>
-          <p:nvSpPr>
-            <p:cNvPr id="113" name="Google Shape;113;p18"/>
-            <p:cNvSpPr txBox="1"/>
-            <p:nvPr/>
-          </p:nvSpPr>
-          <p:spPr>
-            <a:xfrm>
-              <a:off x="1235830" y="1574036"/>
-              <a:ext cx="992700" cy="241200"/>
-            </a:xfrm>
-            <a:prstGeom prst="rect">
-              <a:avLst/>
-            </a:prstGeom>
-            <a:noFill/>
-            <a:ln>
-              <a:noFill/>
-            </a:ln>
-          </p:spPr>
-          <p:txBody>
-            <a:bodyPr spcFirstLastPara="1" wrap="square" lIns="91425" tIns="91425" rIns="91425" bIns="91425" anchor="t" anchorCtr="0">
-              <a:noAutofit/>
-            </a:bodyPr>
-            <a:lstStyle/>
-            <a:p>
-              <a:pPr marL="0" lvl="0" indent="0" algn="r" rtl="0">
-                <a:lnSpc>
-                  <a:spcPct val="115000"/>
-                </a:lnSpc>
-                <a:spcBef>
-                  <a:spcPts val="0"/>
-                </a:spcBef>
-                <a:spcAft>
-                  <a:spcPts val="1600"/>
-                </a:spcAft>
-                <a:buNone/>
-              </a:pPr>
-              <a:r>
-                <a:rPr lang="en" sz="800">
-                  <a:solidFill>
-                    <a:srgbClr val="0C57D3"/>
-                  </a:solidFill>
-                  <a:latin typeface="Roboto"/>
-                  <a:ea typeface="Roboto"/>
-                  <a:cs typeface="Roboto"/>
-                  <a:sym typeface="Roboto"/>
-                </a:rPr>
-                <a:t>November 9/15</a:t>
-              </a:r>
-              <a:endParaRPr sz="800">
-                <a:solidFill>
-                  <a:srgbClr val="0C57D3"/>
-                </a:solidFill>
-                <a:latin typeface="Roboto"/>
-                <a:ea typeface="Roboto"/>
-                <a:cs typeface="Roboto"/>
-                <a:sym typeface="Roboto"/>
-              </a:endParaRPr>
-            </a:p>
-          </p:txBody>
-        </p:sp>
-        <p:sp>
-          <p:nvSpPr>
-            <p:cNvPr id="114" name="Google Shape;114;p18"/>
-            <p:cNvSpPr txBox="1"/>
-            <p:nvPr/>
-          </p:nvSpPr>
-          <p:spPr>
-            <a:xfrm>
-              <a:off x="1235825" y="2695025"/>
-              <a:ext cx="1505100" cy="446400"/>
-            </a:xfrm>
-            <a:prstGeom prst="rect">
-              <a:avLst/>
-            </a:prstGeom>
-            <a:noFill/>
-            <a:ln>
-              <a:noFill/>
-            </a:ln>
-          </p:spPr>
-          <p:txBody>
-            <a:bodyPr spcFirstLastPara="1" wrap="square" lIns="91425" tIns="91425" rIns="91425" bIns="91425" anchor="b" anchorCtr="0">
-              <a:noAutofit/>
-            </a:bodyPr>
-            <a:lstStyle/>
-            <a:p>
-              <a:pPr marL="0" lvl="0" indent="0" algn="l" rtl="0">
-                <a:lnSpc>
-                  <a:spcPct val="115000"/>
-                </a:lnSpc>
-                <a:spcBef>
-                  <a:spcPts val="0"/>
-                </a:spcBef>
-                <a:spcAft>
-                  <a:spcPts val="0"/>
-                </a:spcAft>
-                <a:buNone/>
-              </a:pPr>
-              <a:r>
-                <a:rPr lang="en" sz="1000" b="1">
-                  <a:solidFill>
-                    <a:srgbClr val="0C57D3"/>
-                  </a:solidFill>
-                  <a:latin typeface="Roboto"/>
-                  <a:ea typeface="Roboto"/>
-                  <a:cs typeface="Roboto"/>
-                  <a:sym typeface="Roboto"/>
-                </a:rPr>
-                <a:t>Meeting 4/5</a:t>
-              </a:r>
-              <a:endParaRPr sz="1000" b="1">
-                <a:solidFill>
-                  <a:srgbClr val="0C57D3"/>
-                </a:solidFill>
-                <a:latin typeface="Roboto"/>
-                <a:ea typeface="Roboto"/>
-                <a:cs typeface="Roboto"/>
-                <a:sym typeface="Roboto"/>
-              </a:endParaRPr>
-            </a:p>
-          </p:txBody>
-        </p:sp>
-        <p:sp>
-          <p:nvSpPr>
-            <p:cNvPr id="115" name="Google Shape;115;p18"/>
-            <p:cNvSpPr txBox="1"/>
-            <p:nvPr/>
-          </p:nvSpPr>
-          <p:spPr>
-            <a:xfrm>
-              <a:off x="1215700" y="3151825"/>
-              <a:ext cx="1545600" cy="737400"/>
-            </a:xfrm>
-            <a:prstGeom prst="rect">
-              <a:avLst/>
-            </a:prstGeom>
-            <a:noFill/>
-            <a:ln>
-              <a:noFill/>
-            </a:ln>
-          </p:spPr>
-          <p:txBody>
-            <a:bodyPr spcFirstLastPara="1" wrap="square" lIns="91425" tIns="91425" rIns="91425" bIns="91425" anchor="t" anchorCtr="0">
-              <a:noAutofit/>
-            </a:bodyPr>
-            <a:lstStyle/>
-            <a:p>
-              <a:pPr marL="0" lvl="0" indent="0" algn="l" rtl="0">
-                <a:lnSpc>
-                  <a:spcPct val="115000"/>
-                </a:lnSpc>
-                <a:spcBef>
-                  <a:spcPts val="0"/>
-                </a:spcBef>
-                <a:spcAft>
-                  <a:spcPts val="1600"/>
-                </a:spcAft>
-                <a:buNone/>
-              </a:pPr>
-              <a:r>
-                <a:rPr lang="en" sz="800">
-                  <a:solidFill>
-                    <a:srgbClr val="0C57D3"/>
-                  </a:solidFill>
-                  <a:latin typeface="Roboto"/>
-                  <a:ea typeface="Roboto"/>
-                  <a:cs typeface="Roboto"/>
-                  <a:sym typeface="Roboto"/>
-                </a:rPr>
-                <a:t>Quick meetings designed for a quick progress report.</a:t>
-              </a:r>
-              <a:endParaRPr sz="800">
-                <a:solidFill>
-                  <a:srgbClr val="0C57D3"/>
-                </a:solidFill>
-                <a:latin typeface="Roboto"/>
-                <a:ea typeface="Roboto"/>
-                <a:cs typeface="Roboto"/>
-                <a:sym typeface="Roboto"/>
-              </a:endParaRPr>
-            </a:p>
-          </p:txBody>
-        </p:sp>
-        <p:cxnSp>
-          <p:nvCxnSpPr>
-            <p:cNvPr id="116" name="Google Shape;116;p18"/>
-            <p:cNvCxnSpPr/>
-            <p:nvPr/>
-          </p:nvCxnSpPr>
-          <p:spPr>
-            <a:xfrm>
-              <a:off x="2180202" y="1695421"/>
-              <a:ext cx="718500" cy="741900"/>
-            </a:xfrm>
-            <a:prstGeom prst="straightConnector1">
-              <a:avLst/>
-            </a:prstGeom>
-            <a:noFill/>
-            <a:ln w="9525" cap="flat" cmpd="sng">
-              <a:solidFill>
-                <a:srgbClr val="C2C2C2"/>
-              </a:solidFill>
-              <a:prstDash val="solid"/>
-              <a:round/>
-              <a:headEnd type="none" w="sm" len="sm"/>
-              <a:tailEnd type="none" w="sm" len="sm"/>
-            </a:ln>
-          </p:spPr>
-        </p:cxnSp>
-        <p:sp>
-          <p:nvSpPr>
-            <p:cNvPr id="117" name="Google Shape;117;p18"/>
-            <p:cNvSpPr/>
-            <p:nvPr/>
-          </p:nvSpPr>
-          <p:spPr>
-            <a:xfrm flipH="1">
-              <a:off x="1083025" y="2306625"/>
-              <a:ext cx="1834800" cy="143400"/>
-            </a:xfrm>
-            <a:prstGeom prst="parallelogram">
-              <a:avLst>
-                <a:gd name="adj" fmla="val 96952"/>
-              </a:avLst>
-            </a:prstGeom>
-            <a:solidFill>
-              <a:srgbClr val="0C57D3"/>
-            </a:solidFill>
-            <a:ln>
-              <a:noFill/>
-            </a:ln>
-          </p:spPr>
-          <p:txBody>
-            <a:bodyPr spcFirstLastPara="1" wrap="square" lIns="91425" tIns="91425" rIns="91425" bIns="91425" anchor="ctr" anchorCtr="0">
-              <a:noAutofit/>
-            </a:bodyPr>
-            <a:lstStyle/>
-            <a:p>
-              <a:pPr marL="0" lvl="0" indent="0" algn="l" rtl="0">
-                <a:spcBef>
-                  <a:spcPts val="0"/>
-                </a:spcBef>
-                <a:spcAft>
-                  <a:spcPts val="0"/>
-                </a:spcAft>
-                <a:buNone/>
-              </a:pPr>
-              <a:r>
-                <a:rPr lang="en"/>
-                <a:t>  </a:t>
-              </a:r>
-              <a:endParaRPr/>
-            </a:p>
-          </p:txBody>
-        </p:sp>
-        <p:sp>
-          <p:nvSpPr>
-            <p:cNvPr id="118" name="Google Shape;118;p18"/>
-            <p:cNvSpPr/>
-            <p:nvPr/>
-          </p:nvSpPr>
-          <p:spPr>
-            <a:xfrm>
-              <a:off x="1083125" y="2460449"/>
-              <a:ext cx="1834800" cy="143400"/>
-            </a:xfrm>
-            <a:prstGeom prst="parallelogram">
-              <a:avLst>
-                <a:gd name="adj" fmla="val 96952"/>
-              </a:avLst>
-            </a:prstGeom>
-            <a:solidFill>
-              <a:srgbClr val="1C4587"/>
-            </a:solidFill>
-            <a:ln>
-              <a:noFill/>
-            </a:ln>
-          </p:spPr>
-          <p:txBody>
-            <a:bodyPr spcFirstLastPara="1" wrap="square" lIns="91425" tIns="91425" rIns="91425" bIns="91425" anchor="ctr" anchorCtr="0">
-              <a:noAutofit/>
-            </a:bodyPr>
-            <a:lstStyle/>
-            <a:p>
-              <a:pPr marL="0" lvl="0" indent="0" algn="l" rtl="0">
-                <a:spcBef>
-                  <a:spcPts val="0"/>
-                </a:spcBef>
-                <a:spcAft>
-                  <a:spcPts val="0"/>
-                </a:spcAft>
-                <a:buNone/>
-              </a:pPr>
-              <a:endParaRPr/>
-            </a:p>
-          </p:txBody>
-        </p:sp>
-      </p:grpSp>
-      <p:grpSp>
-        <p:nvGrpSpPr>
-          <p:cNvPr id="119" name="Google Shape;119;p18"/>
-          <p:cNvGrpSpPr/>
-          <p:nvPr/>
-        </p:nvGrpSpPr>
-        <p:grpSpPr>
-          <a:xfrm>
-            <a:off x="6221583" y="1573300"/>
-            <a:ext cx="1834900" cy="2315203"/>
-            <a:chOff x="1083025" y="1574022"/>
-            <a:chExt cx="1834900" cy="2315203"/>
-          </a:xfrm>
-        </p:grpSpPr>
-        <p:sp>
-          <p:nvSpPr>
-            <p:cNvPr id="120" name="Google Shape;120;p18"/>
-            <p:cNvSpPr txBox="1"/>
-            <p:nvPr/>
-          </p:nvSpPr>
-          <p:spPr>
-            <a:xfrm>
-              <a:off x="1377040" y="1574022"/>
-              <a:ext cx="851400" cy="241200"/>
-            </a:xfrm>
-            <a:prstGeom prst="rect">
-              <a:avLst/>
-            </a:prstGeom>
-            <a:noFill/>
-            <a:ln>
-              <a:noFill/>
-            </a:ln>
-          </p:spPr>
-          <p:txBody>
-            <a:bodyPr spcFirstLastPara="1" wrap="square" lIns="91425" tIns="91425" rIns="91425" bIns="91425" anchor="t" anchorCtr="0">
-              <a:noAutofit/>
-            </a:bodyPr>
-            <a:lstStyle/>
-            <a:p>
-              <a:pPr marL="0" lvl="0" indent="0" algn="r" rtl="0">
-                <a:lnSpc>
-                  <a:spcPct val="115000"/>
-                </a:lnSpc>
-                <a:spcBef>
-                  <a:spcPts val="0"/>
-                </a:spcBef>
-                <a:spcAft>
-                  <a:spcPts val="1600"/>
-                </a:spcAft>
-                <a:buNone/>
-              </a:pPr>
-              <a:r>
-                <a:rPr lang="en" sz="800">
-                  <a:solidFill>
-                    <a:srgbClr val="0C57D3"/>
-                  </a:solidFill>
-                  <a:latin typeface="Roboto"/>
-                  <a:ea typeface="Roboto"/>
-                  <a:cs typeface="Roboto"/>
-                  <a:sym typeface="Roboto"/>
-                </a:rPr>
-                <a:t>December 1/5</a:t>
-              </a:r>
-              <a:endParaRPr sz="800">
-                <a:solidFill>
-                  <a:srgbClr val="0C57D3"/>
-                </a:solidFill>
-                <a:latin typeface="Roboto"/>
-                <a:ea typeface="Roboto"/>
-                <a:cs typeface="Roboto"/>
-                <a:sym typeface="Roboto"/>
-              </a:endParaRPr>
-            </a:p>
-          </p:txBody>
-        </p:sp>
-        <p:sp>
-          <p:nvSpPr>
-            <p:cNvPr id="121" name="Google Shape;121;p18"/>
-            <p:cNvSpPr txBox="1"/>
-            <p:nvPr/>
-          </p:nvSpPr>
-          <p:spPr>
-            <a:xfrm>
-              <a:off x="1235825" y="2695025"/>
-              <a:ext cx="1505100" cy="446400"/>
-            </a:xfrm>
-            <a:prstGeom prst="rect">
-              <a:avLst/>
-            </a:prstGeom>
-            <a:noFill/>
-            <a:ln>
-              <a:noFill/>
-            </a:ln>
-          </p:spPr>
-          <p:txBody>
-            <a:bodyPr spcFirstLastPara="1" wrap="square" lIns="91425" tIns="91425" rIns="91425" bIns="91425" anchor="b" anchorCtr="0">
-              <a:noAutofit/>
-            </a:bodyPr>
-            <a:lstStyle/>
-            <a:p>
-              <a:pPr marL="0" lvl="0" indent="0" algn="l" rtl="0">
-                <a:lnSpc>
-                  <a:spcPct val="115000"/>
-                </a:lnSpc>
-                <a:spcBef>
-                  <a:spcPts val="0"/>
-                </a:spcBef>
-                <a:spcAft>
-                  <a:spcPts val="0"/>
-                </a:spcAft>
-                <a:buNone/>
-              </a:pPr>
-              <a:r>
-                <a:rPr lang="en" sz="1000" b="1">
-                  <a:solidFill>
-                    <a:srgbClr val="0C57D3"/>
-                  </a:solidFill>
-                  <a:latin typeface="Roboto"/>
-                  <a:ea typeface="Roboto"/>
-                  <a:cs typeface="Roboto"/>
-                  <a:sym typeface="Roboto"/>
-                </a:rPr>
-                <a:t>Meeting 5/6</a:t>
-              </a:r>
-              <a:endParaRPr sz="1000" b="1">
-                <a:solidFill>
-                  <a:srgbClr val="0C57D3"/>
-                </a:solidFill>
-                <a:latin typeface="Roboto"/>
-                <a:ea typeface="Roboto"/>
-                <a:cs typeface="Roboto"/>
-                <a:sym typeface="Roboto"/>
-              </a:endParaRPr>
-            </a:p>
-          </p:txBody>
-        </p:sp>
-        <p:sp>
-          <p:nvSpPr>
-            <p:cNvPr id="122" name="Google Shape;122;p18"/>
-            <p:cNvSpPr txBox="1"/>
-            <p:nvPr/>
-          </p:nvSpPr>
-          <p:spPr>
-            <a:xfrm>
-              <a:off x="1215700" y="3151825"/>
-              <a:ext cx="1545600" cy="737400"/>
-            </a:xfrm>
-            <a:prstGeom prst="rect">
-              <a:avLst/>
-            </a:prstGeom>
-            <a:noFill/>
-            <a:ln>
-              <a:noFill/>
-            </a:ln>
-          </p:spPr>
-          <p:txBody>
-            <a:bodyPr spcFirstLastPara="1" wrap="square" lIns="91425" tIns="91425" rIns="91425" bIns="91425" anchor="t" anchorCtr="0">
-              <a:noAutofit/>
-            </a:bodyPr>
-            <a:lstStyle/>
-            <a:p>
-              <a:pPr marL="0" lvl="0" indent="0" algn="l" rtl="0">
-                <a:lnSpc>
-                  <a:spcPct val="115000"/>
-                </a:lnSpc>
-                <a:spcBef>
-                  <a:spcPts val="0"/>
-                </a:spcBef>
-                <a:spcAft>
-                  <a:spcPts val="1600"/>
-                </a:spcAft>
-                <a:buNone/>
-              </a:pPr>
-              <a:r>
-                <a:rPr lang="en" sz="800">
-                  <a:solidFill>
-                    <a:srgbClr val="0C57D3"/>
-                  </a:solidFill>
-                  <a:latin typeface="Roboto"/>
-                  <a:ea typeface="Roboto"/>
-                  <a:cs typeface="Roboto"/>
-                  <a:sym typeface="Roboto"/>
-                </a:rPr>
-                <a:t>Finalized the code as well as the project report</a:t>
-              </a:r>
-              <a:endParaRPr sz="800">
-                <a:solidFill>
-                  <a:srgbClr val="0C57D3"/>
-                </a:solidFill>
-                <a:latin typeface="Roboto"/>
-                <a:ea typeface="Roboto"/>
-                <a:cs typeface="Roboto"/>
-                <a:sym typeface="Roboto"/>
-              </a:endParaRPr>
-            </a:p>
-          </p:txBody>
-        </p:sp>
-        <p:cxnSp>
-          <p:nvCxnSpPr>
-            <p:cNvPr id="123" name="Google Shape;123;p18"/>
-            <p:cNvCxnSpPr/>
-            <p:nvPr/>
-          </p:nvCxnSpPr>
-          <p:spPr>
-            <a:xfrm>
-              <a:off x="2180202" y="1695421"/>
-              <a:ext cx="718500" cy="741900"/>
-            </a:xfrm>
-            <a:prstGeom prst="straightConnector1">
-              <a:avLst/>
-            </a:prstGeom>
-            <a:noFill/>
-            <a:ln w="9525" cap="flat" cmpd="sng">
-              <a:solidFill>
-                <a:srgbClr val="C2C2C2"/>
-              </a:solidFill>
-              <a:prstDash val="solid"/>
-              <a:round/>
-              <a:headEnd type="none" w="sm" len="sm"/>
-              <a:tailEnd type="none" w="sm" len="sm"/>
-            </a:ln>
-          </p:spPr>
-        </p:cxnSp>
-        <p:sp>
-          <p:nvSpPr>
-            <p:cNvPr id="124" name="Google Shape;124;p18"/>
-            <p:cNvSpPr/>
-            <p:nvPr/>
-          </p:nvSpPr>
-          <p:spPr>
-            <a:xfrm flipH="1">
-              <a:off x="1083025" y="2306625"/>
-              <a:ext cx="1834800" cy="143400"/>
-            </a:xfrm>
-            <a:prstGeom prst="parallelogram">
-              <a:avLst>
-                <a:gd name="adj" fmla="val 96952"/>
-              </a:avLst>
-            </a:prstGeom>
-            <a:solidFill>
-              <a:srgbClr val="0C57D3"/>
-            </a:solidFill>
-            <a:ln>
-              <a:noFill/>
-            </a:ln>
-          </p:spPr>
-          <p:txBody>
-            <a:bodyPr spcFirstLastPara="1" wrap="square" lIns="91425" tIns="91425" rIns="91425" bIns="91425" anchor="ctr" anchorCtr="0">
-              <a:noAutofit/>
-            </a:bodyPr>
-            <a:lstStyle/>
-            <a:p>
-              <a:pPr marL="0" lvl="0" indent="0" algn="l" rtl="0">
-                <a:spcBef>
-                  <a:spcPts val="0"/>
-                </a:spcBef>
-                <a:spcAft>
-                  <a:spcPts val="0"/>
-                </a:spcAft>
-                <a:buNone/>
-              </a:pPr>
-              <a:r>
-                <a:rPr lang="en"/>
-                <a:t>  </a:t>
-              </a:r>
-              <a:endParaRPr/>
-            </a:p>
-          </p:txBody>
-        </p:sp>
-        <p:sp>
-          <p:nvSpPr>
-            <p:cNvPr id="125" name="Google Shape;125;p18"/>
-            <p:cNvSpPr/>
-            <p:nvPr/>
-          </p:nvSpPr>
-          <p:spPr>
-            <a:xfrm>
-              <a:off x="1083125" y="2460449"/>
-              <a:ext cx="1834800" cy="143400"/>
-            </a:xfrm>
-            <a:prstGeom prst="parallelogram">
-              <a:avLst>
-                <a:gd name="adj" fmla="val 96952"/>
-              </a:avLst>
-            </a:prstGeom>
-            <a:solidFill>
-              <a:srgbClr val="1C4587"/>
-            </a:solidFill>
-            <a:ln>
-              <a:noFill/>
-            </a:ln>
-          </p:spPr>
-          <p:txBody>
-            <a:bodyPr spcFirstLastPara="1" wrap="square" lIns="91425" tIns="91425" rIns="91425" bIns="91425" anchor="ctr" anchorCtr="0">
-              <a:noAutofit/>
-            </a:bodyPr>
-            <a:lstStyle/>
-            <a:p>
-              <a:pPr marL="0" lvl="0" indent="0" algn="l" rtl="0">
-                <a:spcBef>
-                  <a:spcPts val="0"/>
-                </a:spcBef>
-                <a:spcAft>
-                  <a:spcPts val="0"/>
-                </a:spcAft>
-                <a:buNone/>
-              </a:pPr>
-              <a:endParaRPr/>
-            </a:p>
-          </p:txBody>
-        </p:sp>
-      </p:grpSp>
       <p:sp>
         <p:nvSpPr>
-          <p:cNvPr id="126" name="Google Shape;126;p18"/>
-          <p:cNvSpPr txBox="1"/>
-          <p:nvPr/>
+          <p:cNvPr id="2" name="Title 1">
+            <a:extLst>
+              <a:ext uri="{FF2B5EF4-FFF2-40B4-BE49-F238E27FC236}">
+                <a16:creationId xmlns:a16="http://schemas.microsoft.com/office/drawing/2014/main" id="{E0A17BEB-60A5-128C-EDE6-953C8B0B3394}"/>
+              </a:ext>
+            </a:extLst>
+          </p:cNvPr>
+          <p:cNvSpPr>
+            <a:spLocks noGrp="1"/>
+          </p:cNvSpPr>
+          <p:nvPr>
+            <p:ph type="title"/>
+          </p:nvPr>
         </p:nvSpPr>
         <p:spPr>
           <a:xfrm>
-            <a:off x="812525" y="268300"/>
-            <a:ext cx="8148300" cy="720600"/>
+            <a:off x="-90055" y="15533"/>
+            <a:ext cx="9234055" cy="613200"/>
+          </a:xfrm>
+        </p:spPr>
+        <p:txBody>
+          <a:bodyPr>
+            <a:normAutofit fontScale="90000"/>
+          </a:bodyPr>
+          <a:lstStyle/>
+          <a:p>
+            <a:r>
+              <a:rPr lang="en-US" dirty="0"/>
+              <a:t>Compare Accuracy over Epochs for 1D CNN &amp; ANN Keras</a:t>
+            </a:r>
+          </a:p>
+        </p:txBody>
+      </p:sp>
+      <p:pic>
+        <p:nvPicPr>
+          <p:cNvPr id="5" name="Picture 4">
+            <a:extLst>
+              <a:ext uri="{FF2B5EF4-FFF2-40B4-BE49-F238E27FC236}">
+                <a16:creationId xmlns:a16="http://schemas.microsoft.com/office/drawing/2014/main" id="{45D38591-168C-051E-6A27-E1244B9A3623}"/>
+              </a:ext>
+            </a:extLst>
+          </p:cNvPr>
+          <p:cNvPicPr>
+            <a:picLocks noChangeAspect="1"/>
+          </p:cNvPicPr>
+          <p:nvPr/>
+        </p:nvPicPr>
+        <p:blipFill>
+          <a:blip r:embed="rId2"/>
+          <a:stretch>
+            <a:fillRect/>
+          </a:stretch>
+        </p:blipFill>
+        <p:spPr>
+          <a:xfrm>
+            <a:off x="311700" y="574241"/>
+            <a:ext cx="2272173" cy="2036507"/>
           </a:xfrm>
           <a:prstGeom prst="rect">
             <a:avLst/>
           </a:prstGeom>
-          <a:noFill/>
-          <a:ln>
-            <a:noFill/>
-          </a:ln>
         </p:spPr>
-        <p:txBody>
-          <a:bodyPr spcFirstLastPara="1" wrap="square" lIns="91425" tIns="91425" rIns="91425" bIns="91425" anchor="t" anchorCtr="0">
-            <a:noAutofit/>
-          </a:bodyPr>
-          <a:lstStyle/>
-          <a:p>
-            <a:pPr marL="0" lvl="0" indent="0" algn="l" rtl="0">
-              <a:spcBef>
-                <a:spcPts val="0"/>
-              </a:spcBef>
-              <a:spcAft>
-                <a:spcPts val="0"/>
-              </a:spcAft>
-              <a:buNone/>
-            </a:pPr>
-            <a:r>
-              <a:rPr lang="en" sz="2700">
-                <a:solidFill>
-                  <a:schemeClr val="dk1"/>
-                </a:solidFill>
-                <a:latin typeface="Old Standard TT"/>
-                <a:ea typeface="Old Standard TT"/>
-                <a:cs typeface="Old Standard TT"/>
-                <a:sym typeface="Old Standard TT"/>
-              </a:rPr>
-              <a:t>Project Roadmap</a:t>
-            </a:r>
-            <a:endParaRPr sz="2700">
-              <a:solidFill>
-                <a:schemeClr val="dk1"/>
-              </a:solidFill>
-              <a:latin typeface="Old Standard TT"/>
-              <a:ea typeface="Old Standard TT"/>
-              <a:cs typeface="Old Standard TT"/>
-              <a:sym typeface="Old Standard TT"/>
-            </a:endParaRPr>
-          </a:p>
-        </p:txBody>
-      </p:sp>
+      </p:pic>
+      <p:pic>
+        <p:nvPicPr>
+          <p:cNvPr id="7" name="Picture 6">
+            <a:extLst>
+              <a:ext uri="{FF2B5EF4-FFF2-40B4-BE49-F238E27FC236}">
+                <a16:creationId xmlns:a16="http://schemas.microsoft.com/office/drawing/2014/main" id="{3C0AFD90-8049-338A-CB17-C4628A3A61AF}"/>
+              </a:ext>
+            </a:extLst>
+          </p:cNvPr>
+          <p:cNvPicPr>
+            <a:picLocks noChangeAspect="1"/>
+          </p:cNvPicPr>
+          <p:nvPr/>
+        </p:nvPicPr>
+        <p:blipFill>
+          <a:blip r:embed="rId3"/>
+          <a:stretch>
+            <a:fillRect/>
+          </a:stretch>
+        </p:blipFill>
+        <p:spPr>
+          <a:xfrm>
+            <a:off x="0" y="2753504"/>
+            <a:ext cx="2812473" cy="2284408"/>
+          </a:xfrm>
+          <a:prstGeom prst="rect">
+            <a:avLst/>
+          </a:prstGeom>
+        </p:spPr>
+      </p:pic>
+      <p:pic>
+        <p:nvPicPr>
+          <p:cNvPr id="11" name="Picture 10">
+            <a:extLst>
+              <a:ext uri="{FF2B5EF4-FFF2-40B4-BE49-F238E27FC236}">
+                <a16:creationId xmlns:a16="http://schemas.microsoft.com/office/drawing/2014/main" id="{814AB18F-2FCA-6DD4-720C-E5AE13F8E362}"/>
+              </a:ext>
+            </a:extLst>
+          </p:cNvPr>
+          <p:cNvPicPr>
+            <a:picLocks noChangeAspect="1"/>
+          </p:cNvPicPr>
+          <p:nvPr/>
+        </p:nvPicPr>
+        <p:blipFill>
+          <a:blip r:embed="rId4"/>
+          <a:stretch>
+            <a:fillRect/>
+          </a:stretch>
+        </p:blipFill>
+        <p:spPr>
+          <a:xfrm>
+            <a:off x="2812473" y="2753504"/>
+            <a:ext cx="2812473" cy="2206423"/>
+          </a:xfrm>
+          <a:prstGeom prst="rect">
+            <a:avLst/>
+          </a:prstGeom>
+        </p:spPr>
+      </p:pic>
+      <p:pic>
+        <p:nvPicPr>
+          <p:cNvPr id="13" name="Picture 12">
+            <a:extLst>
+              <a:ext uri="{FF2B5EF4-FFF2-40B4-BE49-F238E27FC236}">
+                <a16:creationId xmlns:a16="http://schemas.microsoft.com/office/drawing/2014/main" id="{2A1F3D08-DC27-EED9-90B2-3825CAF62CB0}"/>
+              </a:ext>
+            </a:extLst>
+          </p:cNvPr>
+          <p:cNvPicPr>
+            <a:picLocks noChangeAspect="1"/>
+          </p:cNvPicPr>
+          <p:nvPr/>
+        </p:nvPicPr>
+        <p:blipFill>
+          <a:blip r:embed="rId5"/>
+          <a:stretch>
+            <a:fillRect/>
+          </a:stretch>
+        </p:blipFill>
+        <p:spPr>
+          <a:xfrm>
+            <a:off x="2708564" y="590850"/>
+            <a:ext cx="2916382" cy="2106275"/>
+          </a:xfrm>
+          <a:prstGeom prst="rect">
+            <a:avLst/>
+          </a:prstGeom>
+        </p:spPr>
+      </p:pic>
     </p:spTree>
+    <p:extLst>
+      <p:ext uri="{BB962C8B-B14F-4D97-AF65-F5344CB8AC3E}">
+        <p14:creationId xmlns:p14="http://schemas.microsoft.com/office/powerpoint/2010/main" val="944057045"/>
+      </p:ext>
+    </p:extLst>
   </p:cSld>
   <p:clrMapOvr>
     <a:masterClrMapping/>
@@ -8502,6 +7037,96 @@
 </file>
 
 <file path=ppt/slides/slide11.xml><?xml version="1.0" encoding="utf-8"?>
+<p:sld xmlns:a="http://schemas.openxmlformats.org/drawingml/2006/main" xmlns:r="http://schemas.openxmlformats.org/officeDocument/2006/relationships" xmlns:p="http://schemas.openxmlformats.org/presentationml/2006/main">
+  <p:cSld>
+    <p:spTree>
+      <p:nvGrpSpPr>
+        <p:cNvPr id="1" name=""/>
+        <p:cNvGrpSpPr/>
+        <p:nvPr/>
+      </p:nvGrpSpPr>
+      <p:grpSpPr>
+        <a:xfrm>
+          <a:off x="0" y="0"/>
+          <a:ext cx="0" cy="0"/>
+          <a:chOff x="0" y="0"/>
+          <a:chExt cx="0" cy="0"/>
+        </a:xfrm>
+      </p:grpSpPr>
+      <p:sp>
+        <p:nvSpPr>
+          <p:cNvPr id="2" name="Title 1">
+            <a:extLst>
+              <a:ext uri="{FF2B5EF4-FFF2-40B4-BE49-F238E27FC236}">
+                <a16:creationId xmlns:a16="http://schemas.microsoft.com/office/drawing/2014/main" id="{DB5DBC1D-DCA3-FF63-022D-C69B97D20ABE}"/>
+              </a:ext>
+            </a:extLst>
+          </p:cNvPr>
+          <p:cNvSpPr>
+            <a:spLocks noGrp="1"/>
+          </p:cNvSpPr>
+          <p:nvPr>
+            <p:ph type="title"/>
+          </p:nvPr>
+        </p:nvSpPr>
+        <p:spPr/>
+        <p:txBody>
+          <a:bodyPr>
+            <a:normAutofit fontScale="90000"/>
+          </a:bodyPr>
+          <a:lstStyle/>
+          <a:p>
+            <a:r>
+              <a:rPr lang="en-US" dirty="0"/>
+              <a:t>               Metrics for all my executed Models</a:t>
+            </a:r>
+          </a:p>
+        </p:txBody>
+      </p:sp>
+      <p:pic>
+        <p:nvPicPr>
+          <p:cNvPr id="5" name="Picture 4">
+            <a:extLst>
+              <a:ext uri="{FF2B5EF4-FFF2-40B4-BE49-F238E27FC236}">
+                <a16:creationId xmlns:a16="http://schemas.microsoft.com/office/drawing/2014/main" id="{B4F26FF4-5AFF-E84E-CB38-DF3A47F7F7E9}"/>
+              </a:ext>
+            </a:extLst>
+          </p:cNvPr>
+          <p:cNvPicPr>
+            <a:picLocks noChangeAspect="1"/>
+          </p:cNvPicPr>
+          <p:nvPr/>
+        </p:nvPicPr>
+        <p:blipFill>
+          <a:blip r:embed="rId2"/>
+          <a:stretch>
+            <a:fillRect/>
+          </a:stretch>
+        </p:blipFill>
+        <p:spPr>
+          <a:xfrm>
+            <a:off x="0" y="1907886"/>
+            <a:ext cx="9144000" cy="1327727"/>
+          </a:xfrm>
+          <a:prstGeom prst="rect">
+            <a:avLst/>
+          </a:prstGeom>
+        </p:spPr>
+      </p:pic>
+    </p:spTree>
+    <p:extLst>
+      <p:ext uri="{BB962C8B-B14F-4D97-AF65-F5344CB8AC3E}">
+        <p14:creationId xmlns:p14="http://schemas.microsoft.com/office/powerpoint/2010/main" val="2515423917"/>
+      </p:ext>
+    </p:extLst>
+  </p:cSld>
+  <p:clrMapOvr>
+    <a:masterClrMapping/>
+  </p:clrMapOvr>
+</p:sld>
+</file>
+
+<file path=ppt/slides/slide12.xml><?xml version="1.0" encoding="utf-8"?>
 <p:sld xmlns:a="http://schemas.openxmlformats.org/drawingml/2006/main" xmlns:r="http://schemas.openxmlformats.org/officeDocument/2006/relationships" xmlns:p="http://schemas.openxmlformats.org/presentationml/2006/main">
   <p:cSld>
     <p:spTree>
@@ -8595,7 +7220,7 @@
               <a:buNone/>
             </a:pPr>
             <a:r>
-              <a:rPr lang="en" u="sng">
+              <a:rPr lang="en" u="sng" dirty="0">
                 <a:solidFill>
                   <a:schemeClr val="hlink"/>
                 </a:solidFill>
@@ -8603,7 +7228,7 @@
               </a:rPr>
               <a:t>Our code</a:t>
             </a:r>
-            <a:endParaRPr/>
+            <a:endParaRPr dirty="0"/>
           </a:p>
         </p:txBody>
       </p:sp>
@@ -9358,44 +7983,6 @@
       </p:grpSpPr>
       <p:sp>
         <p:nvSpPr>
-          <p:cNvPr id="79" name="Google Shape;79;p16"/>
-          <p:cNvSpPr txBox="1">
-            <a:spLocks noGrp="1"/>
-          </p:cNvSpPr>
-          <p:nvPr>
-            <p:ph type="title"/>
-          </p:nvPr>
-        </p:nvSpPr>
-        <p:spPr>
-          <a:xfrm>
-            <a:off x="311700" y="445025"/>
-            <a:ext cx="8520600" cy="613200"/>
-          </a:xfrm>
-          <a:prstGeom prst="rect">
-            <a:avLst/>
-          </a:prstGeom>
-        </p:spPr>
-        <p:txBody>
-          <a:bodyPr spcFirstLastPara="1" wrap="square" lIns="91425" tIns="91425" rIns="91425" bIns="91425" anchor="t" anchorCtr="0">
-            <a:normAutofit fontScale="90000"/>
-          </a:bodyPr>
-          <a:lstStyle/>
-          <a:p>
-            <a:pPr marL="0" lvl="0" indent="0" algn="l" rtl="0">
-              <a:spcBef>
-                <a:spcPts val="0"/>
-              </a:spcBef>
-              <a:spcAft>
-                <a:spcPts val="0"/>
-              </a:spcAft>
-              <a:buNone/>
-            </a:pPr>
-            <a:endParaRPr/>
-          </a:p>
-        </p:txBody>
-      </p:sp>
-      <p:sp>
-        <p:nvSpPr>
           <p:cNvPr id="80" name="Google Shape;80;p16"/>
           <p:cNvSpPr txBox="1">
             <a:spLocks noGrp="1"/>
@@ -9406,7 +7993,7 @@
         </p:nvSpPr>
         <p:spPr>
           <a:xfrm>
-            <a:off x="367145" y="2932787"/>
+            <a:off x="367145" y="2691480"/>
             <a:ext cx="4809860" cy="469800"/>
           </a:xfrm>
           <a:prstGeom prst="rect">
@@ -9456,90 +8043,6 @@
           </a:p>
         </p:txBody>
       </p:sp>
-      <p:pic>
-        <p:nvPicPr>
-          <p:cNvPr id="81" name="Google Shape;81;p16"/>
-          <p:cNvPicPr preferRelativeResize="0"/>
-          <p:nvPr/>
-        </p:nvPicPr>
-        <p:blipFill>
-          <a:blip r:embed="rId3">
-            <a:alphaModFix/>
-          </a:blip>
-          <a:stretch>
-            <a:fillRect/>
-          </a:stretch>
-        </p:blipFill>
-        <p:spPr>
-          <a:xfrm>
-            <a:off x="0" y="0"/>
-            <a:ext cx="5544151" cy="2708975"/>
-          </a:xfrm>
-          <a:prstGeom prst="rect">
-            <a:avLst/>
-          </a:prstGeom>
-          <a:noFill/>
-          <a:ln>
-            <a:noFill/>
-          </a:ln>
-        </p:spPr>
-      </p:pic>
-      <p:pic>
-        <p:nvPicPr>
-          <p:cNvPr id="82" name="Google Shape;82;p16"/>
-          <p:cNvPicPr preferRelativeResize="0"/>
-          <p:nvPr/>
-        </p:nvPicPr>
-        <p:blipFill>
-          <a:blip r:embed="rId4">
-            <a:alphaModFix/>
-          </a:blip>
-          <a:stretch>
-            <a:fillRect/>
-          </a:stretch>
-        </p:blipFill>
-        <p:spPr>
-          <a:xfrm>
-            <a:off x="5840813" y="142550"/>
-            <a:ext cx="3303175" cy="2423875"/>
-          </a:xfrm>
-          <a:prstGeom prst="rect">
-            <a:avLst/>
-          </a:prstGeom>
-          <a:noFill/>
-          <a:ln>
-            <a:noFill/>
-          </a:ln>
-        </p:spPr>
-      </p:pic>
-      <p:pic>
-        <p:nvPicPr>
-          <p:cNvPr id="83" name="Google Shape;83;p16"/>
-          <p:cNvPicPr preferRelativeResize="0"/>
-          <p:nvPr/>
-        </p:nvPicPr>
-        <p:blipFill>
-          <a:blip r:embed="rId5">
-            <a:alphaModFix/>
-          </a:blip>
-          <a:stretch>
-            <a:fillRect/>
-          </a:stretch>
-        </p:blipFill>
-        <p:spPr>
-          <a:xfrm>
-            <a:off x="0" y="3392942"/>
-            <a:ext cx="5544151" cy="1253533"/>
-          </a:xfrm>
-          <a:prstGeom prst="rect">
-            <a:avLst/>
-          </a:prstGeom>
-          <a:noFill/>
-          <a:ln>
-            <a:noFill/>
-          </a:ln>
-        </p:spPr>
-      </p:pic>
       <p:sp>
         <p:nvSpPr>
           <p:cNvPr id="84" name="Google Shape;84;p16"/>
@@ -9604,6 +8107,372 @@
       </p:sp>
       <p:sp>
         <p:nvSpPr>
+          <p:cNvPr id="2" name="Google Shape;71;p15">
+            <a:extLst>
+              <a:ext uri="{FF2B5EF4-FFF2-40B4-BE49-F238E27FC236}">
+                <a16:creationId xmlns:a16="http://schemas.microsoft.com/office/drawing/2014/main" id="{9711FBE7-B3E9-7289-11C0-D3B163CF0719}"/>
+              </a:ext>
+            </a:extLst>
+          </p:cNvPr>
+          <p:cNvSpPr txBox="1">
+            <a:spLocks/>
+          </p:cNvSpPr>
+          <p:nvPr/>
+        </p:nvSpPr>
+        <p:spPr>
+          <a:xfrm>
+            <a:off x="96981" y="4730430"/>
+            <a:ext cx="8950037" cy="293085"/>
+          </a:xfrm>
+          <a:prstGeom prst="rect">
+            <a:avLst/>
+          </a:prstGeom>
+          <a:noFill/>
+          <a:ln>
+            <a:noFill/>
+          </a:ln>
+        </p:spPr>
+        <p:txBody>
+          <a:bodyPr spcFirstLastPara="1" wrap="square" lIns="91425" tIns="91425" rIns="91425" bIns="91425" anchor="ctr" anchorCtr="0">
+            <a:noAutofit/>
+          </a:bodyPr>
+          <a:lstStyle>
+            <a:defPPr marR="0" lvl="0" algn="l" rtl="0">
+              <a:lnSpc>
+                <a:spcPct val="100000"/>
+              </a:lnSpc>
+              <a:spcBef>
+                <a:spcPts val="0"/>
+              </a:spcBef>
+              <a:spcAft>
+                <a:spcPts val="0"/>
+              </a:spcAft>
+            </a:defPPr>
+            <a:lvl1pPr marR="0" lvl="0" algn="l" rtl="0">
+              <a:lnSpc>
+                <a:spcPct val="100000"/>
+              </a:lnSpc>
+              <a:spcBef>
+                <a:spcPts val="0"/>
+              </a:spcBef>
+              <a:spcAft>
+                <a:spcPts val="0"/>
+              </a:spcAft>
+              <a:buClr>
+                <a:schemeClr val="dk1"/>
+              </a:buClr>
+              <a:buSzPts val="3000"/>
+              <a:buFont typeface="Old Standard TT"/>
+              <a:buNone/>
+              <a:defRPr sz="3000" b="0" i="0" u="none" strike="noStrike" cap="none">
+                <a:solidFill>
+                  <a:schemeClr val="dk1"/>
+                </a:solidFill>
+                <a:latin typeface="Old Standard TT"/>
+                <a:ea typeface="Old Standard TT"/>
+                <a:cs typeface="Old Standard TT"/>
+                <a:sym typeface="Old Standard TT"/>
+              </a:defRPr>
+            </a:lvl1pPr>
+            <a:lvl2pPr marR="0" lvl="1" algn="l" rtl="0">
+              <a:lnSpc>
+                <a:spcPct val="100000"/>
+              </a:lnSpc>
+              <a:spcBef>
+                <a:spcPts val="0"/>
+              </a:spcBef>
+              <a:spcAft>
+                <a:spcPts val="0"/>
+              </a:spcAft>
+              <a:buClr>
+                <a:schemeClr val="dk1"/>
+              </a:buClr>
+              <a:buSzPts val="3000"/>
+              <a:buFont typeface="Old Standard TT"/>
+              <a:buNone/>
+              <a:defRPr sz="3000" b="0" i="0" u="none" strike="noStrike" cap="none">
+                <a:solidFill>
+                  <a:schemeClr val="dk1"/>
+                </a:solidFill>
+                <a:latin typeface="Old Standard TT"/>
+                <a:ea typeface="Old Standard TT"/>
+                <a:cs typeface="Old Standard TT"/>
+                <a:sym typeface="Old Standard TT"/>
+              </a:defRPr>
+            </a:lvl2pPr>
+            <a:lvl3pPr marR="0" lvl="2" algn="l" rtl="0">
+              <a:lnSpc>
+                <a:spcPct val="100000"/>
+              </a:lnSpc>
+              <a:spcBef>
+                <a:spcPts val="0"/>
+              </a:spcBef>
+              <a:spcAft>
+                <a:spcPts val="0"/>
+              </a:spcAft>
+              <a:buClr>
+                <a:schemeClr val="dk1"/>
+              </a:buClr>
+              <a:buSzPts val="3000"/>
+              <a:buFont typeface="Old Standard TT"/>
+              <a:buNone/>
+              <a:defRPr sz="3000" b="0" i="0" u="none" strike="noStrike" cap="none">
+                <a:solidFill>
+                  <a:schemeClr val="dk1"/>
+                </a:solidFill>
+                <a:latin typeface="Old Standard TT"/>
+                <a:ea typeface="Old Standard TT"/>
+                <a:cs typeface="Old Standard TT"/>
+                <a:sym typeface="Old Standard TT"/>
+              </a:defRPr>
+            </a:lvl3pPr>
+            <a:lvl4pPr marR="0" lvl="3" algn="l" rtl="0">
+              <a:lnSpc>
+                <a:spcPct val="100000"/>
+              </a:lnSpc>
+              <a:spcBef>
+                <a:spcPts val="0"/>
+              </a:spcBef>
+              <a:spcAft>
+                <a:spcPts val="0"/>
+              </a:spcAft>
+              <a:buClr>
+                <a:schemeClr val="dk1"/>
+              </a:buClr>
+              <a:buSzPts val="3000"/>
+              <a:buFont typeface="Old Standard TT"/>
+              <a:buNone/>
+              <a:defRPr sz="3000" b="0" i="0" u="none" strike="noStrike" cap="none">
+                <a:solidFill>
+                  <a:schemeClr val="dk1"/>
+                </a:solidFill>
+                <a:latin typeface="Old Standard TT"/>
+                <a:ea typeface="Old Standard TT"/>
+                <a:cs typeface="Old Standard TT"/>
+                <a:sym typeface="Old Standard TT"/>
+              </a:defRPr>
+            </a:lvl4pPr>
+            <a:lvl5pPr marR="0" lvl="4" algn="l" rtl="0">
+              <a:lnSpc>
+                <a:spcPct val="100000"/>
+              </a:lnSpc>
+              <a:spcBef>
+                <a:spcPts val="0"/>
+              </a:spcBef>
+              <a:spcAft>
+                <a:spcPts val="0"/>
+              </a:spcAft>
+              <a:buClr>
+                <a:schemeClr val="dk1"/>
+              </a:buClr>
+              <a:buSzPts val="3000"/>
+              <a:buFont typeface="Old Standard TT"/>
+              <a:buNone/>
+              <a:defRPr sz="3000" b="0" i="0" u="none" strike="noStrike" cap="none">
+                <a:solidFill>
+                  <a:schemeClr val="dk1"/>
+                </a:solidFill>
+                <a:latin typeface="Old Standard TT"/>
+                <a:ea typeface="Old Standard TT"/>
+                <a:cs typeface="Old Standard TT"/>
+                <a:sym typeface="Old Standard TT"/>
+              </a:defRPr>
+            </a:lvl5pPr>
+            <a:lvl6pPr marR="0" lvl="5" algn="l" rtl="0">
+              <a:lnSpc>
+                <a:spcPct val="100000"/>
+              </a:lnSpc>
+              <a:spcBef>
+                <a:spcPts val="0"/>
+              </a:spcBef>
+              <a:spcAft>
+                <a:spcPts val="0"/>
+              </a:spcAft>
+              <a:buClr>
+                <a:schemeClr val="dk1"/>
+              </a:buClr>
+              <a:buSzPts val="3000"/>
+              <a:buFont typeface="Old Standard TT"/>
+              <a:buNone/>
+              <a:defRPr sz="3000" b="0" i="0" u="none" strike="noStrike" cap="none">
+                <a:solidFill>
+                  <a:schemeClr val="dk1"/>
+                </a:solidFill>
+                <a:latin typeface="Old Standard TT"/>
+                <a:ea typeface="Old Standard TT"/>
+                <a:cs typeface="Old Standard TT"/>
+                <a:sym typeface="Old Standard TT"/>
+              </a:defRPr>
+            </a:lvl6pPr>
+            <a:lvl7pPr marR="0" lvl="6" algn="l" rtl="0">
+              <a:lnSpc>
+                <a:spcPct val="100000"/>
+              </a:lnSpc>
+              <a:spcBef>
+                <a:spcPts val="0"/>
+              </a:spcBef>
+              <a:spcAft>
+                <a:spcPts val="0"/>
+              </a:spcAft>
+              <a:buClr>
+                <a:schemeClr val="dk1"/>
+              </a:buClr>
+              <a:buSzPts val="3000"/>
+              <a:buFont typeface="Old Standard TT"/>
+              <a:buNone/>
+              <a:defRPr sz="3000" b="0" i="0" u="none" strike="noStrike" cap="none">
+                <a:solidFill>
+                  <a:schemeClr val="dk1"/>
+                </a:solidFill>
+                <a:latin typeface="Old Standard TT"/>
+                <a:ea typeface="Old Standard TT"/>
+                <a:cs typeface="Old Standard TT"/>
+                <a:sym typeface="Old Standard TT"/>
+              </a:defRPr>
+            </a:lvl7pPr>
+            <a:lvl8pPr marR="0" lvl="7" algn="l" rtl="0">
+              <a:lnSpc>
+                <a:spcPct val="100000"/>
+              </a:lnSpc>
+              <a:spcBef>
+                <a:spcPts val="0"/>
+              </a:spcBef>
+              <a:spcAft>
+                <a:spcPts val="0"/>
+              </a:spcAft>
+              <a:buClr>
+                <a:schemeClr val="dk1"/>
+              </a:buClr>
+              <a:buSzPts val="3000"/>
+              <a:buFont typeface="Old Standard TT"/>
+              <a:buNone/>
+              <a:defRPr sz="3000" b="0" i="0" u="none" strike="noStrike" cap="none">
+                <a:solidFill>
+                  <a:schemeClr val="dk1"/>
+                </a:solidFill>
+                <a:latin typeface="Old Standard TT"/>
+                <a:ea typeface="Old Standard TT"/>
+                <a:cs typeface="Old Standard TT"/>
+                <a:sym typeface="Old Standard TT"/>
+              </a:defRPr>
+            </a:lvl8pPr>
+            <a:lvl9pPr marR="0" lvl="8" algn="l" rtl="0">
+              <a:lnSpc>
+                <a:spcPct val="100000"/>
+              </a:lnSpc>
+              <a:spcBef>
+                <a:spcPts val="0"/>
+              </a:spcBef>
+              <a:spcAft>
+                <a:spcPts val="0"/>
+              </a:spcAft>
+              <a:buClr>
+                <a:schemeClr val="dk1"/>
+              </a:buClr>
+              <a:buSzPts val="3000"/>
+              <a:buFont typeface="Old Standard TT"/>
+              <a:buNone/>
+              <a:defRPr sz="3000" b="0" i="0" u="none" strike="noStrike" cap="none">
+                <a:solidFill>
+                  <a:schemeClr val="dk1"/>
+                </a:solidFill>
+                <a:latin typeface="Old Standard TT"/>
+                <a:ea typeface="Old Standard TT"/>
+                <a:cs typeface="Old Standard TT"/>
+                <a:sym typeface="Old Standard TT"/>
+              </a:defRPr>
+            </a:lvl9pPr>
+          </a:lstStyle>
+          <a:p>
+            <a:pPr algn="ctr">
+              <a:lnSpc>
+                <a:spcPct val="115000"/>
+              </a:lnSpc>
+              <a:spcBef>
+                <a:spcPts val="1400"/>
+              </a:spcBef>
+              <a:spcAft>
+                <a:spcPts val="400"/>
+              </a:spcAft>
+              <a:buSzPts val="1100"/>
+              <a:buFont typeface="Arial"/>
+              <a:buNone/>
+            </a:pPr>
+            <a:r>
+              <a:rPr lang="en-US" sz="1400" b="1" dirty="0">
+                <a:latin typeface="Arial"/>
+                <a:ea typeface="Arial"/>
+                <a:cs typeface="Arial"/>
+                <a:sym typeface="Arial"/>
+              </a:rPr>
+              <a:t>Data Analysis &amp; Feature Extraction</a:t>
+            </a:r>
+            <a:endParaRPr lang="en-US" sz="1400" dirty="0"/>
+          </a:p>
+        </p:txBody>
+      </p:sp>
+      <p:pic>
+        <p:nvPicPr>
+          <p:cNvPr id="4" name="Picture 3">
+            <a:extLst>
+              <a:ext uri="{FF2B5EF4-FFF2-40B4-BE49-F238E27FC236}">
+                <a16:creationId xmlns:a16="http://schemas.microsoft.com/office/drawing/2014/main" id="{99BDB803-9093-BB5A-C58F-3A84586827BC}"/>
+              </a:ext>
+            </a:extLst>
+          </p:cNvPr>
+          <p:cNvPicPr>
+            <a:picLocks noChangeAspect="1"/>
+          </p:cNvPicPr>
+          <p:nvPr/>
+        </p:nvPicPr>
+        <p:blipFill>
+          <a:blip r:embed="rId3"/>
+          <a:stretch>
+            <a:fillRect/>
+          </a:stretch>
+        </p:blipFill>
+        <p:spPr>
+          <a:xfrm>
+            <a:off x="96981" y="47576"/>
+            <a:ext cx="4973783" cy="2482427"/>
+          </a:xfrm>
+          <a:prstGeom prst="rect">
+            <a:avLst/>
+          </a:prstGeom>
+        </p:spPr>
+      </p:pic>
+      <p:pic>
+        <p:nvPicPr>
+          <p:cNvPr id="6" name="Picture 5">
+            <a:extLst>
+              <a:ext uri="{FF2B5EF4-FFF2-40B4-BE49-F238E27FC236}">
+                <a16:creationId xmlns:a16="http://schemas.microsoft.com/office/drawing/2014/main" id="{7DC9AA45-6DD4-ADF9-053A-21326D768650}"/>
+              </a:ext>
+            </a:extLst>
+          </p:cNvPr>
+          <p:cNvPicPr>
+            <a:picLocks noChangeAspect="1"/>
+          </p:cNvPicPr>
+          <p:nvPr/>
+        </p:nvPicPr>
+        <p:blipFill>
+          <a:blip r:embed="rId4"/>
+          <a:stretch>
+            <a:fillRect/>
+          </a:stretch>
+        </p:blipFill>
+        <p:spPr>
+          <a:xfrm>
+            <a:off x="5544151" y="47576"/>
+            <a:ext cx="3599849" cy="2597496"/>
+          </a:xfrm>
+          <a:prstGeom prst="rect">
+            <a:avLst/>
+          </a:prstGeom>
+        </p:spPr>
+      </p:pic>
+      <p:sp>
+        <p:nvSpPr>
           <p:cNvPr id="85" name="Google Shape;85;p16"/>
           <p:cNvSpPr txBox="1">
             <a:spLocks noGrp="1"/>
@@ -9614,7 +8483,7 @@
         </p:nvSpPr>
         <p:spPr>
           <a:xfrm>
-            <a:off x="1821873" y="2203708"/>
+            <a:off x="1401642" y="1998010"/>
             <a:ext cx="3775363" cy="469800"/>
           </a:xfrm>
           <a:prstGeom prst="rect">
@@ -9680,312 +8549,66 @@
           </a:p>
         </p:txBody>
       </p:sp>
-      <p:sp>
-        <p:nvSpPr>
-          <p:cNvPr id="2" name="Google Shape;71;p15">
+      <p:pic>
+        <p:nvPicPr>
+          <p:cNvPr id="8" name="Picture 7">
             <a:extLst>
               <a:ext uri="{FF2B5EF4-FFF2-40B4-BE49-F238E27FC236}">
-                <a16:creationId xmlns:a16="http://schemas.microsoft.com/office/drawing/2014/main" id="{9711FBE7-B3E9-7289-11C0-D3B163CF0719}"/>
+                <a16:creationId xmlns:a16="http://schemas.microsoft.com/office/drawing/2014/main" id="{C0AB4E28-1438-035A-C70D-E5CA0A1FDCF2}"/>
               </a:ext>
             </a:extLst>
           </p:cNvPr>
-          <p:cNvSpPr txBox="1">
-            <a:spLocks/>
-          </p:cNvSpPr>
+          <p:cNvPicPr>
+            <a:picLocks noChangeAspect="1"/>
+          </p:cNvPicPr>
           <p:nvPr/>
-        </p:nvSpPr>
+        </p:nvPicPr>
+        <p:blipFill>
+          <a:blip r:embed="rId5"/>
+          <a:stretch>
+            <a:fillRect/>
+          </a:stretch>
+        </p:blipFill>
         <p:spPr>
           <a:xfrm>
-            <a:off x="96981" y="4615362"/>
-            <a:ext cx="8950037" cy="408154"/>
+            <a:off x="0" y="3141749"/>
+            <a:ext cx="6091771" cy="1588682"/>
           </a:xfrm>
           <a:prstGeom prst="rect">
             <a:avLst/>
           </a:prstGeom>
-          <a:noFill/>
-          <a:ln>
-            <a:noFill/>
-          </a:ln>
         </p:spPr>
-        <p:txBody>
-          <a:bodyPr spcFirstLastPara="1" wrap="square" lIns="91425" tIns="91425" rIns="91425" bIns="91425" anchor="ctr" anchorCtr="0">
-            <a:noAutofit/>
-          </a:bodyPr>
-          <a:lstStyle>
-            <a:defPPr marR="0" lvl="0" algn="l" rtl="0">
-              <a:lnSpc>
-                <a:spcPct val="100000"/>
-              </a:lnSpc>
-              <a:spcBef>
-                <a:spcPts val="0"/>
-              </a:spcBef>
-              <a:spcAft>
-                <a:spcPts val="0"/>
-              </a:spcAft>
-            </a:defPPr>
-            <a:lvl1pPr marR="0" lvl="0" algn="l" rtl="0">
-              <a:lnSpc>
-                <a:spcPct val="100000"/>
-              </a:lnSpc>
-              <a:spcBef>
-                <a:spcPts val="0"/>
-              </a:spcBef>
-              <a:spcAft>
-                <a:spcPts val="0"/>
-              </a:spcAft>
-              <a:buClr>
-                <a:schemeClr val="dk1"/>
-              </a:buClr>
-              <a:buSzPts val="3000"/>
-              <a:buFont typeface="Old Standard TT"/>
-              <a:buNone/>
-              <a:defRPr sz="3000" b="0" i="0" u="none" strike="noStrike" cap="none">
-                <a:solidFill>
-                  <a:schemeClr val="dk1"/>
-                </a:solidFill>
-                <a:latin typeface="Old Standard TT"/>
-                <a:ea typeface="Old Standard TT"/>
-                <a:cs typeface="Old Standard TT"/>
-                <a:sym typeface="Old Standard TT"/>
-              </a:defRPr>
-            </a:lvl1pPr>
-            <a:lvl2pPr marR="0" lvl="1" algn="l" rtl="0">
-              <a:lnSpc>
-                <a:spcPct val="100000"/>
-              </a:lnSpc>
-              <a:spcBef>
-                <a:spcPts val="0"/>
-              </a:spcBef>
-              <a:spcAft>
-                <a:spcPts val="0"/>
-              </a:spcAft>
-              <a:buClr>
-                <a:schemeClr val="dk1"/>
-              </a:buClr>
-              <a:buSzPts val="3000"/>
-              <a:buFont typeface="Old Standard TT"/>
-              <a:buNone/>
-              <a:defRPr sz="3000" b="0" i="0" u="none" strike="noStrike" cap="none">
-                <a:solidFill>
-                  <a:schemeClr val="dk1"/>
-                </a:solidFill>
-                <a:latin typeface="Old Standard TT"/>
-                <a:ea typeface="Old Standard TT"/>
-                <a:cs typeface="Old Standard TT"/>
-                <a:sym typeface="Old Standard TT"/>
-              </a:defRPr>
-            </a:lvl2pPr>
-            <a:lvl3pPr marR="0" lvl="2" algn="l" rtl="0">
-              <a:lnSpc>
-                <a:spcPct val="100000"/>
-              </a:lnSpc>
-              <a:spcBef>
-                <a:spcPts val="0"/>
-              </a:spcBef>
-              <a:spcAft>
-                <a:spcPts val="0"/>
-              </a:spcAft>
-              <a:buClr>
-                <a:schemeClr val="dk1"/>
-              </a:buClr>
-              <a:buSzPts val="3000"/>
-              <a:buFont typeface="Old Standard TT"/>
-              <a:buNone/>
-              <a:defRPr sz="3000" b="0" i="0" u="none" strike="noStrike" cap="none">
-                <a:solidFill>
-                  <a:schemeClr val="dk1"/>
-                </a:solidFill>
-                <a:latin typeface="Old Standard TT"/>
-                <a:ea typeface="Old Standard TT"/>
-                <a:cs typeface="Old Standard TT"/>
-                <a:sym typeface="Old Standard TT"/>
-              </a:defRPr>
-            </a:lvl3pPr>
-            <a:lvl4pPr marR="0" lvl="3" algn="l" rtl="0">
-              <a:lnSpc>
-                <a:spcPct val="100000"/>
-              </a:lnSpc>
-              <a:spcBef>
-                <a:spcPts val="0"/>
-              </a:spcBef>
-              <a:spcAft>
-                <a:spcPts val="0"/>
-              </a:spcAft>
-              <a:buClr>
-                <a:schemeClr val="dk1"/>
-              </a:buClr>
-              <a:buSzPts val="3000"/>
-              <a:buFont typeface="Old Standard TT"/>
-              <a:buNone/>
-              <a:defRPr sz="3000" b="0" i="0" u="none" strike="noStrike" cap="none">
-                <a:solidFill>
-                  <a:schemeClr val="dk1"/>
-                </a:solidFill>
-                <a:latin typeface="Old Standard TT"/>
-                <a:ea typeface="Old Standard TT"/>
-                <a:cs typeface="Old Standard TT"/>
-                <a:sym typeface="Old Standard TT"/>
-              </a:defRPr>
-            </a:lvl4pPr>
-            <a:lvl5pPr marR="0" lvl="4" algn="l" rtl="0">
-              <a:lnSpc>
-                <a:spcPct val="100000"/>
-              </a:lnSpc>
-              <a:spcBef>
-                <a:spcPts val="0"/>
-              </a:spcBef>
-              <a:spcAft>
-                <a:spcPts val="0"/>
-              </a:spcAft>
-              <a:buClr>
-                <a:schemeClr val="dk1"/>
-              </a:buClr>
-              <a:buSzPts val="3000"/>
-              <a:buFont typeface="Old Standard TT"/>
-              <a:buNone/>
-              <a:defRPr sz="3000" b="0" i="0" u="none" strike="noStrike" cap="none">
-                <a:solidFill>
-                  <a:schemeClr val="dk1"/>
-                </a:solidFill>
-                <a:latin typeface="Old Standard TT"/>
-                <a:ea typeface="Old Standard TT"/>
-                <a:cs typeface="Old Standard TT"/>
-                <a:sym typeface="Old Standard TT"/>
-              </a:defRPr>
-            </a:lvl5pPr>
-            <a:lvl6pPr marR="0" lvl="5" algn="l" rtl="0">
-              <a:lnSpc>
-                <a:spcPct val="100000"/>
-              </a:lnSpc>
-              <a:spcBef>
-                <a:spcPts val="0"/>
-              </a:spcBef>
-              <a:spcAft>
-                <a:spcPts val="0"/>
-              </a:spcAft>
-              <a:buClr>
-                <a:schemeClr val="dk1"/>
-              </a:buClr>
-              <a:buSzPts val="3000"/>
-              <a:buFont typeface="Old Standard TT"/>
-              <a:buNone/>
-              <a:defRPr sz="3000" b="0" i="0" u="none" strike="noStrike" cap="none">
-                <a:solidFill>
-                  <a:schemeClr val="dk1"/>
-                </a:solidFill>
-                <a:latin typeface="Old Standard TT"/>
-                <a:ea typeface="Old Standard TT"/>
-                <a:cs typeface="Old Standard TT"/>
-                <a:sym typeface="Old Standard TT"/>
-              </a:defRPr>
-            </a:lvl6pPr>
-            <a:lvl7pPr marR="0" lvl="6" algn="l" rtl="0">
-              <a:lnSpc>
-                <a:spcPct val="100000"/>
-              </a:lnSpc>
-              <a:spcBef>
-                <a:spcPts val="0"/>
-              </a:spcBef>
-              <a:spcAft>
-                <a:spcPts val="0"/>
-              </a:spcAft>
-              <a:buClr>
-                <a:schemeClr val="dk1"/>
-              </a:buClr>
-              <a:buSzPts val="3000"/>
-              <a:buFont typeface="Old Standard TT"/>
-              <a:buNone/>
-              <a:defRPr sz="3000" b="0" i="0" u="none" strike="noStrike" cap="none">
-                <a:solidFill>
-                  <a:schemeClr val="dk1"/>
-                </a:solidFill>
-                <a:latin typeface="Old Standard TT"/>
-                <a:ea typeface="Old Standard TT"/>
-                <a:cs typeface="Old Standard TT"/>
-                <a:sym typeface="Old Standard TT"/>
-              </a:defRPr>
-            </a:lvl7pPr>
-            <a:lvl8pPr marR="0" lvl="7" algn="l" rtl="0">
-              <a:lnSpc>
-                <a:spcPct val="100000"/>
-              </a:lnSpc>
-              <a:spcBef>
-                <a:spcPts val="0"/>
-              </a:spcBef>
-              <a:spcAft>
-                <a:spcPts val="0"/>
-              </a:spcAft>
-              <a:buClr>
-                <a:schemeClr val="dk1"/>
-              </a:buClr>
-              <a:buSzPts val="3000"/>
-              <a:buFont typeface="Old Standard TT"/>
-              <a:buNone/>
-              <a:defRPr sz="3000" b="0" i="0" u="none" strike="noStrike" cap="none">
-                <a:solidFill>
-                  <a:schemeClr val="dk1"/>
-                </a:solidFill>
-                <a:latin typeface="Old Standard TT"/>
-                <a:ea typeface="Old Standard TT"/>
-                <a:cs typeface="Old Standard TT"/>
-                <a:sym typeface="Old Standard TT"/>
-              </a:defRPr>
-            </a:lvl8pPr>
-            <a:lvl9pPr marR="0" lvl="8" algn="l" rtl="0">
-              <a:lnSpc>
-                <a:spcPct val="100000"/>
-              </a:lnSpc>
-              <a:spcBef>
-                <a:spcPts val="0"/>
-              </a:spcBef>
-              <a:spcAft>
-                <a:spcPts val="0"/>
-              </a:spcAft>
-              <a:buClr>
-                <a:schemeClr val="dk1"/>
-              </a:buClr>
-              <a:buSzPts val="3000"/>
-              <a:buFont typeface="Old Standard TT"/>
-              <a:buNone/>
-              <a:defRPr sz="3000" b="0" i="0" u="none" strike="noStrike" cap="none">
-                <a:solidFill>
-                  <a:schemeClr val="dk1"/>
-                </a:solidFill>
-                <a:latin typeface="Old Standard TT"/>
-                <a:ea typeface="Old Standard TT"/>
-                <a:cs typeface="Old Standard TT"/>
-                <a:sym typeface="Old Standard TT"/>
-              </a:defRPr>
-            </a:lvl9pPr>
-          </a:lstStyle>
-          <a:p>
-            <a:pPr algn="ctr">
-              <a:lnSpc>
-                <a:spcPct val="115000"/>
-              </a:lnSpc>
-              <a:spcBef>
-                <a:spcPts val="1400"/>
-              </a:spcBef>
-              <a:spcAft>
-                <a:spcPts val="400"/>
-              </a:spcAft>
-              <a:buSzPts val="1100"/>
-              <a:buFont typeface="Arial"/>
-              <a:buNone/>
-            </a:pPr>
-            <a:r>
-              <a:rPr lang="en-US" sz="1400" b="1" dirty="0">
-                <a:latin typeface="Arial"/>
-                <a:ea typeface="Arial"/>
-                <a:cs typeface="Arial"/>
-                <a:sym typeface="Arial"/>
-              </a:rPr>
-              <a:t>Data Analysis &amp; Feature Extraction</a:t>
-            </a:r>
-            <a:endParaRPr lang="en-US" sz="1400" dirty="0"/>
-          </a:p>
-        </p:txBody>
-      </p:sp>
+      </p:pic>
+      <p:pic>
+        <p:nvPicPr>
+          <p:cNvPr id="10" name="Picture 9">
+            <a:extLst>
+              <a:ext uri="{FF2B5EF4-FFF2-40B4-BE49-F238E27FC236}">
+                <a16:creationId xmlns:a16="http://schemas.microsoft.com/office/drawing/2014/main" id="{9C7C32C0-09A7-6305-6AB1-C76F2287FBB9}"/>
+              </a:ext>
+            </a:extLst>
+          </p:cNvPr>
+          <p:cNvPicPr>
+            <a:picLocks noChangeAspect="1"/>
+          </p:cNvPicPr>
+          <p:nvPr/>
+        </p:nvPicPr>
+        <p:blipFill>
+          <a:blip r:embed="rId6"/>
+          <a:stretch>
+            <a:fillRect/>
+          </a:stretch>
+        </p:blipFill>
+        <p:spPr>
+          <a:xfrm>
+            <a:off x="6091771" y="3124414"/>
+            <a:ext cx="1431247" cy="1615027"/>
+          </a:xfrm>
+          <a:prstGeom prst="rect">
+            <a:avLst/>
+          </a:prstGeom>
+        </p:spPr>
+      </p:pic>
     </p:spTree>
   </p:cSld>
   <p:clrMapOvr>
@@ -9995,6 +8618,282 @@
 </file>
 
 <file path=ppt/slides/slide5.xml><?xml version="1.0" encoding="utf-8"?>
+<p:sld xmlns:a="http://schemas.openxmlformats.org/drawingml/2006/main" xmlns:r="http://schemas.openxmlformats.org/officeDocument/2006/relationships" xmlns:p="http://schemas.openxmlformats.org/presentationml/2006/main">
+  <p:cSld>
+    <p:spTree>
+      <p:nvGrpSpPr>
+        <p:cNvPr id="1" name=""/>
+        <p:cNvGrpSpPr/>
+        <p:nvPr/>
+      </p:nvGrpSpPr>
+      <p:grpSpPr>
+        <a:xfrm>
+          <a:off x="0" y="0"/>
+          <a:ext cx="0" cy="0"/>
+          <a:chOff x="0" y="0"/>
+          <a:chExt cx="0" cy="0"/>
+        </a:xfrm>
+      </p:grpSpPr>
+      <p:sp>
+        <p:nvSpPr>
+          <p:cNvPr id="2" name="Title 1">
+            <a:extLst>
+              <a:ext uri="{FF2B5EF4-FFF2-40B4-BE49-F238E27FC236}">
+                <a16:creationId xmlns:a16="http://schemas.microsoft.com/office/drawing/2014/main" id="{E560E1E2-ED8A-DC8B-6599-EC9FF2EA35CF}"/>
+              </a:ext>
+            </a:extLst>
+          </p:cNvPr>
+          <p:cNvSpPr>
+            <a:spLocks noGrp="1"/>
+          </p:cNvSpPr>
+          <p:nvPr>
+            <p:ph type="title"/>
+          </p:nvPr>
+        </p:nvSpPr>
+        <p:spPr>
+          <a:xfrm>
+            <a:off x="0" y="0"/>
+            <a:ext cx="9144000" cy="613200"/>
+          </a:xfrm>
+        </p:spPr>
+        <p:txBody>
+          <a:bodyPr>
+            <a:noAutofit/>
+          </a:bodyPr>
+          <a:lstStyle/>
+          <a:p>
+            <a:r>
+              <a:rPr lang="en-US" sz="1800" dirty="0"/>
+              <a:t>                                 Feature Co-relations (no major co-relations found</a:t>
+            </a:r>
+          </a:p>
+        </p:txBody>
+      </p:sp>
+      <p:pic>
+        <p:nvPicPr>
+          <p:cNvPr id="4" name="Picture 3">
+            <a:extLst>
+              <a:ext uri="{FF2B5EF4-FFF2-40B4-BE49-F238E27FC236}">
+                <a16:creationId xmlns:a16="http://schemas.microsoft.com/office/drawing/2014/main" id="{8A6DF076-AC0C-ADA3-7417-3EE8DCAE8B88}"/>
+              </a:ext>
+            </a:extLst>
+          </p:cNvPr>
+          <p:cNvPicPr>
+            <a:picLocks noChangeAspect="1"/>
+          </p:cNvPicPr>
+          <p:nvPr/>
+        </p:nvPicPr>
+        <p:blipFill>
+          <a:blip r:embed="rId2"/>
+          <a:stretch>
+            <a:fillRect/>
+          </a:stretch>
+        </p:blipFill>
+        <p:spPr>
+          <a:xfrm>
+            <a:off x="2037918" y="810489"/>
+            <a:ext cx="4398338" cy="3861955"/>
+          </a:xfrm>
+          <a:prstGeom prst="rect">
+            <a:avLst/>
+          </a:prstGeom>
+        </p:spPr>
+      </p:pic>
+    </p:spTree>
+    <p:extLst>
+      <p:ext uri="{BB962C8B-B14F-4D97-AF65-F5344CB8AC3E}">
+        <p14:creationId xmlns:p14="http://schemas.microsoft.com/office/powerpoint/2010/main" val="1856447569"/>
+      </p:ext>
+    </p:extLst>
+  </p:cSld>
+  <p:clrMapOvr>
+    <a:masterClrMapping/>
+  </p:clrMapOvr>
+</p:sld>
+</file>
+
+<file path=ppt/slides/slide6.xml><?xml version="1.0" encoding="utf-8"?>
+<p:sld xmlns:a="http://schemas.openxmlformats.org/drawingml/2006/main" xmlns:r="http://schemas.openxmlformats.org/officeDocument/2006/relationships" xmlns:p="http://schemas.openxmlformats.org/presentationml/2006/main">
+  <p:cSld>
+    <p:spTree>
+      <p:nvGrpSpPr>
+        <p:cNvPr id="1" name=""/>
+        <p:cNvGrpSpPr/>
+        <p:nvPr/>
+      </p:nvGrpSpPr>
+      <p:grpSpPr>
+        <a:xfrm>
+          <a:off x="0" y="0"/>
+          <a:ext cx="0" cy="0"/>
+          <a:chOff x="0" y="0"/>
+          <a:chExt cx="0" cy="0"/>
+        </a:xfrm>
+      </p:grpSpPr>
+      <p:sp>
+        <p:nvSpPr>
+          <p:cNvPr id="2" name="Title 1">
+            <a:extLst>
+              <a:ext uri="{FF2B5EF4-FFF2-40B4-BE49-F238E27FC236}">
+                <a16:creationId xmlns:a16="http://schemas.microsoft.com/office/drawing/2014/main" id="{35E45419-E6B7-4477-175A-7E5FC52DC0A3}"/>
+              </a:ext>
+            </a:extLst>
+          </p:cNvPr>
+          <p:cNvSpPr>
+            <a:spLocks noGrp="1"/>
+          </p:cNvSpPr>
+          <p:nvPr>
+            <p:ph type="title"/>
+          </p:nvPr>
+        </p:nvSpPr>
+        <p:spPr>
+          <a:xfrm>
+            <a:off x="263209" y="91735"/>
+            <a:ext cx="8520600" cy="613200"/>
+          </a:xfrm>
+        </p:spPr>
+        <p:txBody>
+          <a:bodyPr>
+            <a:normAutofit fontScale="90000"/>
+          </a:bodyPr>
+          <a:lstStyle/>
+          <a:p>
+            <a:r>
+              <a:rPr lang="en-US" dirty="0"/>
+              <a:t>Machine Learning Algorithms used</a:t>
+            </a:r>
+          </a:p>
+        </p:txBody>
+      </p:sp>
+      <p:sp>
+        <p:nvSpPr>
+          <p:cNvPr id="3" name="Text Placeholder 2">
+            <a:extLst>
+              <a:ext uri="{FF2B5EF4-FFF2-40B4-BE49-F238E27FC236}">
+                <a16:creationId xmlns:a16="http://schemas.microsoft.com/office/drawing/2014/main" id="{8C582B70-07E3-4D46-8F18-CB9D915AC6D7}"/>
+              </a:ext>
+            </a:extLst>
+          </p:cNvPr>
+          <p:cNvSpPr>
+            <a:spLocks noGrp="1"/>
+          </p:cNvSpPr>
+          <p:nvPr>
+            <p:ph type="body" idx="1"/>
+          </p:nvPr>
+        </p:nvSpPr>
+        <p:spPr/>
+        <p:txBody>
+          <a:bodyPr/>
+          <a:lstStyle/>
+          <a:p>
+            <a:r>
+              <a:rPr lang="en-US" dirty="0"/>
+              <a:t>Convolutional Neural Network</a:t>
+            </a:r>
+          </a:p>
+          <a:p>
+            <a:pPr lvl="1"/>
+            <a:r>
+              <a:rPr lang="en-US" dirty="0"/>
+              <a:t>Implement Conv1D to extract meaningful local patterns from features of Heart Failure Dataset</a:t>
+            </a:r>
+          </a:p>
+          <a:p>
+            <a:pPr lvl="1"/>
+            <a:r>
+              <a:rPr lang="en-US" dirty="0"/>
+              <a:t>Used MaxPooling to reduce dimensionality (pool_size=2)</a:t>
+            </a:r>
+          </a:p>
+          <a:p>
+            <a:pPr lvl="1"/>
+            <a:r>
+              <a:rPr lang="en-US" dirty="0"/>
+              <a:t>GlobalAveragePooling flattens into a vector</a:t>
+            </a:r>
+          </a:p>
+          <a:p>
+            <a:pPr lvl="1"/>
+            <a:r>
+              <a:rPr lang="en-US" dirty="0"/>
+              <a:t>Added Dense layers for final prediction</a:t>
+            </a:r>
+          </a:p>
+          <a:p>
+            <a:r>
+              <a:rPr lang="en-US" dirty="0"/>
+              <a:t>Artificial Neural Network (SkLearn method &amp; Keras/TensorFlow methods)</a:t>
+            </a:r>
+          </a:p>
+          <a:p>
+            <a:pPr lvl="1"/>
+            <a:r>
+              <a:rPr lang="en-US" dirty="0"/>
+              <a:t>Implement ANN by instantiating as an "object" of </a:t>
+            </a:r>
+            <a:r>
+              <a:rPr lang="en-US" dirty="0" err="1"/>
+              <a:t>MLPClassifier</a:t>
+            </a:r>
+            <a:r>
+              <a:rPr lang="en-US" dirty="0"/>
+              <a:t> "class"</a:t>
+            </a:r>
+          </a:p>
+          <a:p>
+            <a:pPr lvl="1"/>
+            <a:r>
+              <a:rPr lang="en-US" dirty="0"/>
+              <a:t>Attempted cross-validation, Grid search with single hidden layer &amp; Grid search with 2 layers.</a:t>
+            </a:r>
+          </a:p>
+          <a:p>
+            <a:pPr lvl="1"/>
+            <a:r>
+              <a:rPr lang="en-US" dirty="0"/>
+              <a:t>Implemented a Sequential model from Keras module with 4 Dense layers.</a:t>
+            </a:r>
+          </a:p>
+          <a:p>
+            <a:r>
+              <a:rPr lang="en-US" dirty="0"/>
+              <a:t>Support Vector Machines</a:t>
+            </a:r>
+          </a:p>
+          <a:p>
+            <a:pPr lvl="1"/>
+            <a:r>
+              <a:rPr lang="en-US" dirty="0"/>
+              <a:t>Implement Support Vector classifier for classification task on Heart Failure Dataset.</a:t>
+            </a:r>
+          </a:p>
+          <a:p>
+            <a:pPr lvl="1"/>
+            <a:endParaRPr lang="en-US" dirty="0"/>
+          </a:p>
+          <a:p>
+            <a:pPr lvl="1"/>
+            <a:endParaRPr lang="en-US" dirty="0"/>
+          </a:p>
+          <a:p>
+            <a:pPr lvl="1"/>
+            <a:endParaRPr lang="en-US" dirty="0"/>
+          </a:p>
+        </p:txBody>
+      </p:sp>
+    </p:spTree>
+    <p:extLst>
+      <p:ext uri="{BB962C8B-B14F-4D97-AF65-F5344CB8AC3E}">
+        <p14:creationId xmlns:p14="http://schemas.microsoft.com/office/powerpoint/2010/main" val="1392457845"/>
+      </p:ext>
+    </p:extLst>
+  </p:cSld>
+  <p:clrMapOvr>
+    <a:masterClrMapping/>
+  </p:clrMapOvr>
+</p:sld>
+</file>
+
+<file path=ppt/slides/slide7.xml><?xml version="1.0" encoding="utf-8"?>
 <p:sld xmlns:a="http://schemas.openxmlformats.org/drawingml/2006/main" xmlns:r="http://schemas.openxmlformats.org/officeDocument/2006/relationships" xmlns:p="http://schemas.openxmlformats.org/presentationml/2006/main">
   <p:cSld>
     <p:spTree>
@@ -10089,305 +8988,6 @@
 </p:sld>
 </file>
 
-<file path=ppt/slides/slide6.xml><?xml version="1.0" encoding="utf-8"?>
-<p:sld xmlns:a="http://schemas.openxmlformats.org/drawingml/2006/main" xmlns:r="http://schemas.openxmlformats.org/officeDocument/2006/relationships" xmlns:p="http://schemas.openxmlformats.org/presentationml/2006/main">
-  <p:cSld>
-    <p:spTree>
-      <p:nvGrpSpPr>
-        <p:cNvPr id="1" name=""/>
-        <p:cNvGrpSpPr/>
-        <p:nvPr/>
-      </p:nvGrpSpPr>
-      <p:grpSpPr>
-        <a:xfrm>
-          <a:off x="0" y="0"/>
-          <a:ext cx="0" cy="0"/>
-          <a:chOff x="0" y="0"/>
-          <a:chExt cx="0" cy="0"/>
-        </a:xfrm>
-      </p:grpSpPr>
-      <p:sp>
-        <p:nvSpPr>
-          <p:cNvPr id="2" name="Title 1">
-            <a:extLst>
-              <a:ext uri="{FF2B5EF4-FFF2-40B4-BE49-F238E27FC236}">
-                <a16:creationId xmlns:a16="http://schemas.microsoft.com/office/drawing/2014/main" id="{35E45419-E6B7-4477-175A-7E5FC52DC0A3}"/>
-              </a:ext>
-            </a:extLst>
-          </p:cNvPr>
-          <p:cNvSpPr>
-            <a:spLocks noGrp="1"/>
-          </p:cNvSpPr>
-          <p:nvPr>
-            <p:ph type="title"/>
-          </p:nvPr>
-        </p:nvSpPr>
-        <p:spPr>
-          <a:xfrm>
-            <a:off x="263209" y="91735"/>
-            <a:ext cx="8520600" cy="613200"/>
-          </a:xfrm>
-        </p:spPr>
-        <p:txBody>
-          <a:bodyPr>
-            <a:normAutofit fontScale="90000"/>
-          </a:bodyPr>
-          <a:lstStyle/>
-          <a:p>
-            <a:r>
-              <a:rPr lang="en-US" dirty="0"/>
-              <a:t>Machine Learning Algorithms used</a:t>
-            </a:r>
-          </a:p>
-        </p:txBody>
-      </p:sp>
-      <p:sp>
-        <p:nvSpPr>
-          <p:cNvPr id="3" name="Text Placeholder 2">
-            <a:extLst>
-              <a:ext uri="{FF2B5EF4-FFF2-40B4-BE49-F238E27FC236}">
-                <a16:creationId xmlns:a16="http://schemas.microsoft.com/office/drawing/2014/main" id="{8C582B70-07E3-4D46-8F18-CB9D915AC6D7}"/>
-              </a:ext>
-            </a:extLst>
-          </p:cNvPr>
-          <p:cNvSpPr>
-            <a:spLocks noGrp="1"/>
-          </p:cNvSpPr>
-          <p:nvPr>
-            <p:ph type="body" idx="1"/>
-          </p:nvPr>
-        </p:nvSpPr>
-        <p:spPr/>
-        <p:txBody>
-          <a:bodyPr/>
-          <a:lstStyle/>
-          <a:p>
-            <a:r>
-              <a:rPr lang="en-US" dirty="0"/>
-              <a:t>Random Forest Classification</a:t>
-            </a:r>
-          </a:p>
-          <a:p>
-            <a:pPr lvl="1"/>
-            <a:r>
-              <a:rPr lang="en-US" dirty="0"/>
-              <a:t>The target Label for Cancer Data set is a categorical outcome, Diagnosis (Malignant or Binary).</a:t>
-            </a:r>
-          </a:p>
-          <a:p>
-            <a:pPr lvl="1"/>
-            <a:r>
-              <a:rPr lang="en-US" dirty="0"/>
-              <a:t>Hence the classification approach was chosen.</a:t>
-            </a:r>
-          </a:p>
-          <a:p>
-            <a:r>
-              <a:rPr lang="en-US" dirty="0"/>
-              <a:t>Random Forest Logistic Regression</a:t>
-            </a:r>
-          </a:p>
-          <a:p>
-            <a:pPr lvl="1"/>
-            <a:r>
-              <a:rPr lang="en-US" dirty="0"/>
-              <a:t>The Binary Label or Diagnosis is Encoded &amp; the Regression model is trained to generate predictions between 0 &amp; 1.</a:t>
-            </a:r>
-          </a:p>
-          <a:p>
-            <a:pPr lvl="1"/>
-            <a:r>
-              <a:rPr lang="en-US" dirty="0"/>
-              <a:t>A sigmoid or discretize function is used to map predicted values to probabilities between 0 &amp; 1.</a:t>
-            </a:r>
-          </a:p>
-          <a:p>
-            <a:pPr lvl="1"/>
-            <a:r>
-              <a:rPr lang="en-US" dirty="0"/>
-              <a:t>The output probability is then thresholded (0.4) to classify results into categories.</a:t>
-            </a:r>
-          </a:p>
-        </p:txBody>
-      </p:sp>
-    </p:spTree>
-    <p:extLst>
-      <p:ext uri="{BB962C8B-B14F-4D97-AF65-F5344CB8AC3E}">
-        <p14:creationId xmlns:p14="http://schemas.microsoft.com/office/powerpoint/2010/main" val="1392457845"/>
-      </p:ext>
-    </p:extLst>
-  </p:cSld>
-  <p:clrMapOvr>
-    <a:masterClrMapping/>
-  </p:clrMapOvr>
-</p:sld>
-</file>
-
-<file path=ppt/slides/slide7.xml><?xml version="1.0" encoding="utf-8"?>
-<p:sld xmlns:a="http://schemas.openxmlformats.org/drawingml/2006/main" xmlns:r="http://schemas.openxmlformats.org/officeDocument/2006/relationships" xmlns:p="http://schemas.openxmlformats.org/presentationml/2006/main">
-  <p:cSld>
-    <p:spTree>
-      <p:nvGrpSpPr>
-        <p:cNvPr id="1" name="Shape 89"/>
-        <p:cNvGrpSpPr/>
-        <p:nvPr/>
-      </p:nvGrpSpPr>
-      <p:grpSpPr>
-        <a:xfrm>
-          <a:off x="0" y="0"/>
-          <a:ext cx="0" cy="0"/>
-          <a:chOff x="0" y="0"/>
-          <a:chExt cx="0" cy="0"/>
-        </a:xfrm>
-      </p:grpSpPr>
-      <p:sp>
-        <p:nvSpPr>
-          <p:cNvPr id="90" name="Google Shape;90;p17"/>
-          <p:cNvSpPr txBox="1">
-            <a:spLocks noGrp="1"/>
-          </p:cNvSpPr>
-          <p:nvPr>
-            <p:ph type="title"/>
-          </p:nvPr>
-        </p:nvSpPr>
-        <p:spPr>
-          <a:xfrm>
-            <a:off x="311700" y="185500"/>
-            <a:ext cx="8520600" cy="613200"/>
-          </a:xfrm>
-          <a:prstGeom prst="rect">
-            <a:avLst/>
-          </a:prstGeom>
-        </p:spPr>
-        <p:txBody>
-          <a:bodyPr spcFirstLastPara="1" wrap="square" lIns="91425" tIns="91425" rIns="91425" bIns="91425" anchor="t" anchorCtr="0">
-            <a:normAutofit fontScale="90000"/>
-          </a:bodyPr>
-          <a:lstStyle/>
-          <a:p>
-            <a:pPr marL="0" lvl="0" indent="0" algn="l" rtl="0">
-              <a:spcBef>
-                <a:spcPts val="0"/>
-              </a:spcBef>
-              <a:spcAft>
-                <a:spcPts val="0"/>
-              </a:spcAft>
-              <a:buNone/>
-            </a:pPr>
-            <a:r>
-              <a:rPr lang="en"/>
-              <a:t>Analysis of Most Important Features</a:t>
-            </a:r>
-            <a:endParaRPr/>
-          </a:p>
-        </p:txBody>
-      </p:sp>
-      <p:sp>
-        <p:nvSpPr>
-          <p:cNvPr id="91" name="Google Shape;91;p17"/>
-          <p:cNvSpPr txBox="1">
-            <a:spLocks noGrp="1"/>
-          </p:cNvSpPr>
-          <p:nvPr>
-            <p:ph type="body" idx="1"/>
-          </p:nvPr>
-        </p:nvSpPr>
-        <p:spPr>
-          <a:xfrm>
-            <a:off x="311700" y="4364900"/>
-            <a:ext cx="8520600" cy="534300"/>
-          </a:xfrm>
-          <a:prstGeom prst="rect">
-            <a:avLst/>
-          </a:prstGeom>
-        </p:spPr>
-        <p:txBody>
-          <a:bodyPr spcFirstLastPara="1" wrap="square" lIns="91425" tIns="91425" rIns="91425" bIns="91425" anchor="t" anchorCtr="0">
-            <a:normAutofit fontScale="70000" lnSpcReduction="20000"/>
-          </a:bodyPr>
-          <a:lstStyle/>
-          <a:p>
-            <a:pPr marL="0" lvl="0" indent="0" algn="l" rtl="0">
-              <a:spcBef>
-                <a:spcPts val="0"/>
-              </a:spcBef>
-              <a:spcAft>
-                <a:spcPts val="1200"/>
-              </a:spcAft>
-              <a:buNone/>
-            </a:pPr>
-            <a:r>
-              <a:rPr lang="en" dirty="0"/>
-              <a:t>“area_worst “ &amp; “perimter_worst” features contribute highest to the disease diagnosis</a:t>
-            </a:r>
-            <a:endParaRPr dirty="0"/>
-          </a:p>
-        </p:txBody>
-      </p:sp>
-      <p:pic>
-        <p:nvPicPr>
-          <p:cNvPr id="92" name="Google Shape;92;p17"/>
-          <p:cNvPicPr preferRelativeResize="0"/>
-          <p:nvPr/>
-        </p:nvPicPr>
-        <p:blipFill>
-          <a:blip r:embed="rId3">
-            <a:alphaModFix/>
-          </a:blip>
-          <a:stretch>
-            <a:fillRect/>
-          </a:stretch>
-        </p:blipFill>
-        <p:spPr>
-          <a:xfrm>
-            <a:off x="4905775" y="1058225"/>
-            <a:ext cx="4067825" cy="2918000"/>
-          </a:xfrm>
-          <a:prstGeom prst="rect">
-            <a:avLst/>
-          </a:prstGeom>
-          <a:noFill/>
-          <a:ln>
-            <a:noFill/>
-          </a:ln>
-        </p:spPr>
-      </p:pic>
-      <p:pic>
-        <p:nvPicPr>
-          <p:cNvPr id="93" name="Google Shape;93;p17"/>
-          <p:cNvPicPr preferRelativeResize="0"/>
-          <p:nvPr/>
-        </p:nvPicPr>
-        <p:blipFill>
-          <a:blip r:embed="rId4">
-            <a:alphaModFix/>
-          </a:blip>
-          <a:stretch>
-            <a:fillRect/>
-          </a:stretch>
-        </p:blipFill>
-        <p:spPr>
-          <a:xfrm>
-            <a:off x="152400" y="951100"/>
-            <a:ext cx="4600974" cy="3037536"/>
-          </a:xfrm>
-          <a:prstGeom prst="rect">
-            <a:avLst/>
-          </a:prstGeom>
-          <a:noFill/>
-          <a:ln>
-            <a:noFill/>
-          </a:ln>
-        </p:spPr>
-      </p:pic>
-    </p:spTree>
-  </p:cSld>
-  <p:clrMapOvr>
-    <a:masterClrMapping/>
-  </p:clrMapOvr>
-</p:sld>
-</file>
-
 <file path=ppt/slides/slide8.xml><?xml version="1.0" encoding="utf-8"?>
 <p:sld xmlns:a="http://schemas.openxmlformats.org/drawingml/2006/main" xmlns:r="http://schemas.openxmlformats.org/officeDocument/2006/relationships" xmlns:p="http://schemas.openxmlformats.org/presentationml/2006/main">
   <p:cSld>
@@ -10410,7 +9010,7 @@
           <p:cNvPr id="2" name="Title 1">
             <a:extLst>
               <a:ext uri="{FF2B5EF4-FFF2-40B4-BE49-F238E27FC236}">
-                <a16:creationId xmlns:a16="http://schemas.microsoft.com/office/drawing/2014/main" id="{E560E1E2-ED8A-DC8B-6599-EC9FF2EA35CF}"/>
+                <a16:creationId xmlns:a16="http://schemas.microsoft.com/office/drawing/2014/main" id="{B8B5C211-B45C-1845-674B-6E9DA78663FD}"/>
               </a:ext>
             </a:extLst>
           </p:cNvPr>
@@ -10423,19 +9023,19 @@
         </p:nvSpPr>
         <p:spPr>
           <a:xfrm>
-            <a:off x="0" y="0"/>
-            <a:ext cx="9144000" cy="613200"/>
+            <a:off x="311700" y="112516"/>
+            <a:ext cx="8520600" cy="613200"/>
           </a:xfrm>
         </p:spPr>
         <p:txBody>
           <a:bodyPr>
-            <a:noAutofit/>
+            <a:normAutofit fontScale="90000"/>
           </a:bodyPr>
           <a:lstStyle/>
           <a:p>
             <a:r>
-              <a:rPr lang="en-US" sz="1800" dirty="0"/>
-              <a:t>“area_worst” &amp; “perimeter_worst” contribute highest to Cancer diagnosis but are also highly correlated to each other.</a:t>
+              <a:rPr lang="en-US" dirty="0"/>
+              <a:t>Compare ROC, Accuracy &amp; AUC </a:t>
             </a:r>
           </a:p>
         </p:txBody>
@@ -10445,7 +9045,7 @@
           <p:cNvPr id="5" name="Picture 4">
             <a:extLst>
               <a:ext uri="{FF2B5EF4-FFF2-40B4-BE49-F238E27FC236}">
-                <a16:creationId xmlns:a16="http://schemas.microsoft.com/office/drawing/2014/main" id="{E1BA6C86-E866-5C0C-90D9-45FAC140EC90}"/>
+                <a16:creationId xmlns:a16="http://schemas.microsoft.com/office/drawing/2014/main" id="{37228C5F-D17F-21A2-B2E1-E603A21EE45E}"/>
               </a:ext>
             </a:extLst>
           </p:cNvPr>
@@ -10462,8 +9062,296 @@
         </p:blipFill>
         <p:spPr>
           <a:xfrm>
-            <a:off x="1907610" y="698006"/>
-            <a:ext cx="5580772" cy="4214328"/>
+            <a:off x="1" y="811437"/>
+            <a:ext cx="3186851" cy="2247301"/>
+          </a:xfrm>
+          <a:prstGeom prst="rect">
+            <a:avLst/>
+          </a:prstGeom>
+        </p:spPr>
+      </p:pic>
+      <p:pic>
+        <p:nvPicPr>
+          <p:cNvPr id="9" name="Picture 8">
+            <a:extLst>
+              <a:ext uri="{FF2B5EF4-FFF2-40B4-BE49-F238E27FC236}">
+                <a16:creationId xmlns:a16="http://schemas.microsoft.com/office/drawing/2014/main" id="{03523C63-DABD-2A2C-9F3C-5AD6EAC3ED10}"/>
+              </a:ext>
+            </a:extLst>
+          </p:cNvPr>
+          <p:cNvPicPr>
+            <a:picLocks noChangeAspect="1"/>
+          </p:cNvPicPr>
+          <p:nvPr/>
+        </p:nvPicPr>
+        <p:blipFill>
+          <a:blip r:embed="rId3"/>
+          <a:stretch>
+            <a:fillRect/>
+          </a:stretch>
+        </p:blipFill>
+        <p:spPr>
+          <a:xfrm>
+            <a:off x="6111703" y="828827"/>
+            <a:ext cx="3031814" cy="2247301"/>
+          </a:xfrm>
+          <a:prstGeom prst="rect">
+            <a:avLst/>
+          </a:prstGeom>
+        </p:spPr>
+      </p:pic>
+      <p:pic>
+        <p:nvPicPr>
+          <p:cNvPr id="11" name="Picture 10">
+            <a:extLst>
+              <a:ext uri="{FF2B5EF4-FFF2-40B4-BE49-F238E27FC236}">
+                <a16:creationId xmlns:a16="http://schemas.microsoft.com/office/drawing/2014/main" id="{DACC46FD-AB53-0C15-FFD0-16489CFFD605}"/>
+              </a:ext>
+            </a:extLst>
+          </p:cNvPr>
+          <p:cNvPicPr>
+            <a:picLocks noChangeAspect="1"/>
+          </p:cNvPicPr>
+          <p:nvPr/>
+        </p:nvPicPr>
+        <p:blipFill>
+          <a:blip r:embed="rId4"/>
+          <a:stretch>
+            <a:fillRect/>
+          </a:stretch>
+        </p:blipFill>
+        <p:spPr>
+          <a:xfrm>
+            <a:off x="3060006" y="811438"/>
+            <a:ext cx="3079405" cy="2290146"/>
+          </a:xfrm>
+          <a:prstGeom prst="rect">
+            <a:avLst/>
+          </a:prstGeom>
+        </p:spPr>
+      </p:pic>
+      <p:sp>
+        <p:nvSpPr>
+          <p:cNvPr id="24" name="Arrow: Down 23">
+            <a:extLst>
+              <a:ext uri="{FF2B5EF4-FFF2-40B4-BE49-F238E27FC236}">
+                <a16:creationId xmlns:a16="http://schemas.microsoft.com/office/drawing/2014/main" id="{BB51BF22-A42C-3A12-5B9C-00BD8E5B658E}"/>
+              </a:ext>
+            </a:extLst>
+          </p:cNvPr>
+          <p:cNvSpPr/>
+          <p:nvPr/>
+        </p:nvSpPr>
+        <p:spPr>
+          <a:xfrm>
+            <a:off x="1593426" y="3271404"/>
+            <a:ext cx="173182" cy="188349"/>
+          </a:xfrm>
+          <a:prstGeom prst="downArrow">
+            <a:avLst/>
+          </a:prstGeom>
+        </p:spPr>
+        <p:style>
+          <a:lnRef idx="2">
+            <a:schemeClr val="accent1">
+              <a:shade val="15000"/>
+            </a:schemeClr>
+          </a:lnRef>
+          <a:fillRef idx="1">
+            <a:schemeClr val="accent1"/>
+          </a:fillRef>
+          <a:effectRef idx="0">
+            <a:schemeClr val="accent1"/>
+          </a:effectRef>
+          <a:fontRef idx="minor">
+            <a:schemeClr val="lt1"/>
+          </a:fontRef>
+        </p:style>
+        <p:txBody>
+          <a:bodyPr rtlCol="0" anchor="ctr"/>
+          <a:lstStyle/>
+          <a:p>
+            <a:pPr algn="ctr"/>
+            <a:endParaRPr lang="en-US"/>
+          </a:p>
+        </p:txBody>
+      </p:sp>
+      <p:sp>
+        <p:nvSpPr>
+          <p:cNvPr id="25" name="Arrow: Down 24">
+            <a:extLst>
+              <a:ext uri="{FF2B5EF4-FFF2-40B4-BE49-F238E27FC236}">
+                <a16:creationId xmlns:a16="http://schemas.microsoft.com/office/drawing/2014/main" id="{2A937C4B-C9BF-4409-B0E3-E44CB0CADC10}"/>
+              </a:ext>
+            </a:extLst>
+          </p:cNvPr>
+          <p:cNvSpPr/>
+          <p:nvPr/>
+        </p:nvSpPr>
+        <p:spPr>
+          <a:xfrm>
+            <a:off x="4496071" y="3280642"/>
+            <a:ext cx="173182" cy="188349"/>
+          </a:xfrm>
+          <a:prstGeom prst="downArrow">
+            <a:avLst/>
+          </a:prstGeom>
+        </p:spPr>
+        <p:style>
+          <a:lnRef idx="2">
+            <a:schemeClr val="accent1">
+              <a:shade val="15000"/>
+            </a:schemeClr>
+          </a:lnRef>
+          <a:fillRef idx="1">
+            <a:schemeClr val="accent1"/>
+          </a:fillRef>
+          <a:effectRef idx="0">
+            <a:schemeClr val="accent1"/>
+          </a:effectRef>
+          <a:fontRef idx="minor">
+            <a:schemeClr val="lt1"/>
+          </a:fontRef>
+        </p:style>
+        <p:txBody>
+          <a:bodyPr rtlCol="0" anchor="ctr"/>
+          <a:lstStyle/>
+          <a:p>
+            <a:pPr algn="ctr"/>
+            <a:endParaRPr lang="en-US"/>
+          </a:p>
+        </p:txBody>
+      </p:sp>
+      <p:sp>
+        <p:nvSpPr>
+          <p:cNvPr id="26" name="Arrow: Down 25">
+            <a:extLst>
+              <a:ext uri="{FF2B5EF4-FFF2-40B4-BE49-F238E27FC236}">
+                <a16:creationId xmlns:a16="http://schemas.microsoft.com/office/drawing/2014/main" id="{C87FCB8A-A756-1CD8-6DA3-9C80AFFE0996}"/>
+              </a:ext>
+            </a:extLst>
+          </p:cNvPr>
+          <p:cNvSpPr/>
+          <p:nvPr/>
+        </p:nvSpPr>
+        <p:spPr>
+          <a:xfrm>
+            <a:off x="7676603" y="3104014"/>
+            <a:ext cx="173182" cy="188349"/>
+          </a:xfrm>
+          <a:prstGeom prst="downArrow">
+            <a:avLst/>
+          </a:prstGeom>
+        </p:spPr>
+        <p:style>
+          <a:lnRef idx="2">
+            <a:schemeClr val="accent1">
+              <a:shade val="15000"/>
+            </a:schemeClr>
+          </a:lnRef>
+          <a:fillRef idx="1">
+            <a:schemeClr val="accent1"/>
+          </a:fillRef>
+          <a:effectRef idx="0">
+            <a:schemeClr val="accent1"/>
+          </a:effectRef>
+          <a:fontRef idx="minor">
+            <a:schemeClr val="lt1"/>
+          </a:fontRef>
+        </p:style>
+        <p:txBody>
+          <a:bodyPr rtlCol="0" anchor="ctr"/>
+          <a:lstStyle/>
+          <a:p>
+            <a:pPr algn="ctr"/>
+            <a:endParaRPr lang="en-US"/>
+          </a:p>
+        </p:txBody>
+      </p:sp>
+      <p:pic>
+        <p:nvPicPr>
+          <p:cNvPr id="30" name="Picture 29">
+            <a:extLst>
+              <a:ext uri="{FF2B5EF4-FFF2-40B4-BE49-F238E27FC236}">
+                <a16:creationId xmlns:a16="http://schemas.microsoft.com/office/drawing/2014/main" id="{92CCC55D-CD9C-BE95-0BB5-D765C2270FA5}"/>
+              </a:ext>
+            </a:extLst>
+          </p:cNvPr>
+          <p:cNvPicPr>
+            <a:picLocks noChangeAspect="1"/>
+          </p:cNvPicPr>
+          <p:nvPr/>
+        </p:nvPicPr>
+        <p:blipFill>
+          <a:blip r:embed="rId5"/>
+          <a:stretch>
+            <a:fillRect/>
+          </a:stretch>
+        </p:blipFill>
+        <p:spPr>
+          <a:xfrm>
+            <a:off x="6299527" y="3776566"/>
+            <a:ext cx="2754152" cy="1108300"/>
+          </a:xfrm>
+          <a:prstGeom prst="rect">
+            <a:avLst/>
+          </a:prstGeom>
+        </p:spPr>
+      </p:pic>
+      <p:pic>
+        <p:nvPicPr>
+          <p:cNvPr id="4" name="Picture 3">
+            <a:extLst>
+              <a:ext uri="{FF2B5EF4-FFF2-40B4-BE49-F238E27FC236}">
+                <a16:creationId xmlns:a16="http://schemas.microsoft.com/office/drawing/2014/main" id="{2CB148B4-52B2-3132-F3C9-58EE22267E11}"/>
+              </a:ext>
+            </a:extLst>
+          </p:cNvPr>
+          <p:cNvPicPr>
+            <a:picLocks noChangeAspect="1"/>
+          </p:cNvPicPr>
+          <p:nvPr/>
+        </p:nvPicPr>
+        <p:blipFill>
+          <a:blip r:embed="rId6"/>
+          <a:stretch>
+            <a:fillRect/>
+          </a:stretch>
+        </p:blipFill>
+        <p:spPr>
+          <a:xfrm>
+            <a:off x="118412" y="3776952"/>
+            <a:ext cx="3076757" cy="1126181"/>
+          </a:xfrm>
+          <a:prstGeom prst="rect">
+            <a:avLst/>
+          </a:prstGeom>
+        </p:spPr>
+      </p:pic>
+      <p:pic>
+        <p:nvPicPr>
+          <p:cNvPr id="7" name="Picture 6">
+            <a:extLst>
+              <a:ext uri="{FF2B5EF4-FFF2-40B4-BE49-F238E27FC236}">
+                <a16:creationId xmlns:a16="http://schemas.microsoft.com/office/drawing/2014/main" id="{E4BEC290-9859-D55F-F1C4-AE1CBCBEA4DB}"/>
+              </a:ext>
+            </a:extLst>
+          </p:cNvPr>
+          <p:cNvPicPr>
+            <a:picLocks noChangeAspect="1"/>
+          </p:cNvPicPr>
+          <p:nvPr/>
+        </p:nvPicPr>
+        <p:blipFill>
+          <a:blip r:embed="rId7"/>
+          <a:stretch>
+            <a:fillRect/>
+          </a:stretch>
+        </p:blipFill>
+        <p:spPr>
+          <a:xfrm>
+            <a:off x="3242388" y="3758685"/>
+            <a:ext cx="2985292" cy="1126181"/>
           </a:xfrm>
           <a:prstGeom prst="rect">
             <a:avLst/>
@@ -10473,7 +9361,7 @@
     </p:spTree>
     <p:extLst>
       <p:ext uri="{BB962C8B-B14F-4D97-AF65-F5344CB8AC3E}">
-        <p14:creationId xmlns:p14="http://schemas.microsoft.com/office/powerpoint/2010/main" val="1856447569"/>
+        <p14:creationId xmlns:p14="http://schemas.microsoft.com/office/powerpoint/2010/main" val="1468857112"/>
       </p:ext>
     </p:extLst>
   </p:cSld>
@@ -10502,10 +9390,10 @@
       </p:grpSpPr>
       <p:sp>
         <p:nvSpPr>
-          <p:cNvPr id="2" name="Title 1">
+          <p:cNvPr id="4" name="Title 1">
             <a:extLst>
               <a:ext uri="{FF2B5EF4-FFF2-40B4-BE49-F238E27FC236}">
-                <a16:creationId xmlns:a16="http://schemas.microsoft.com/office/drawing/2014/main" id="{54310129-A8D3-F578-8698-0AF30F36B78B}"/>
+                <a16:creationId xmlns:a16="http://schemas.microsoft.com/office/drawing/2014/main" id="{1338B850-906A-F5A6-065A-8370DE137726}"/>
               </a:ext>
             </a:extLst>
           </p:cNvPr>
@@ -10518,29 +9406,29 @@
         </p:nvSpPr>
         <p:spPr>
           <a:xfrm>
-            <a:off x="0" y="0"/>
-            <a:ext cx="9144000" cy="401782"/>
+            <a:off x="311700" y="112516"/>
+            <a:ext cx="8520600" cy="613200"/>
           </a:xfrm>
         </p:spPr>
         <p:txBody>
           <a:bodyPr>
-            <a:normAutofit/>
+            <a:normAutofit fontScale="90000"/>
           </a:bodyPr>
           <a:lstStyle/>
           <a:p>
             <a:r>
-              <a:rPr lang="en-US" sz="1400" b="1" dirty="0"/>
-              <a:t>Results: ML Algorithms for Random Forest Classification &amp; Random Forest Logistic Regression were executed </a:t>
+              <a:rPr lang="en-US" dirty="0"/>
+              <a:t>Compare ROC, Accuracy &amp; AUC </a:t>
             </a:r>
           </a:p>
         </p:txBody>
       </p:sp>
       <p:pic>
         <p:nvPicPr>
-          <p:cNvPr id="7" name="Picture 6">
+          <p:cNvPr id="6" name="Picture 5">
             <a:extLst>
               <a:ext uri="{FF2B5EF4-FFF2-40B4-BE49-F238E27FC236}">
-                <a16:creationId xmlns:a16="http://schemas.microsoft.com/office/drawing/2014/main" id="{3C905897-5BED-864B-650B-4CF8F8D2299E}"/>
+                <a16:creationId xmlns:a16="http://schemas.microsoft.com/office/drawing/2014/main" id="{BBDAE359-C826-0314-B3FE-225A023EEE2B}"/>
               </a:ext>
             </a:extLst>
           </p:cNvPr>
@@ -10557,8 +9445,8 @@
         </p:blipFill>
         <p:spPr>
           <a:xfrm>
-            <a:off x="33872" y="517900"/>
-            <a:ext cx="4898346" cy="4261921"/>
+            <a:off x="235930" y="725717"/>
+            <a:ext cx="2809980" cy="2169884"/>
           </a:xfrm>
           <a:prstGeom prst="rect">
             <a:avLst/>
@@ -10567,10 +9455,10 @@
       </p:pic>
       <p:pic>
         <p:nvPicPr>
-          <p:cNvPr id="9" name="Picture 8">
+          <p:cNvPr id="8" name="Picture 7">
             <a:extLst>
               <a:ext uri="{FF2B5EF4-FFF2-40B4-BE49-F238E27FC236}">
-                <a16:creationId xmlns:a16="http://schemas.microsoft.com/office/drawing/2014/main" id="{AD2CE38C-A98E-DDE1-2BB8-3B7039994590}"/>
+                <a16:creationId xmlns:a16="http://schemas.microsoft.com/office/drawing/2014/main" id="{A7E4B613-E6B7-5D07-E062-9E8E4D918D38}"/>
               </a:ext>
             </a:extLst>
           </p:cNvPr>
@@ -10587,8 +9475,8 @@
         </p:blipFill>
         <p:spPr>
           <a:xfrm>
-            <a:off x="4865020" y="575118"/>
-            <a:ext cx="4278751" cy="2895448"/>
+            <a:off x="0" y="3690389"/>
+            <a:ext cx="3045910" cy="1029808"/>
           </a:xfrm>
           <a:prstGeom prst="rect">
             <a:avLst/>
@@ -10597,68 +9485,266 @@
       </p:pic>
       <p:sp>
         <p:nvSpPr>
-          <p:cNvPr id="10" name="Google Shape;91;p17">
+          <p:cNvPr id="9" name="Arrow: Down 8">
             <a:extLst>
               <a:ext uri="{FF2B5EF4-FFF2-40B4-BE49-F238E27FC236}">
-                <a16:creationId xmlns:a16="http://schemas.microsoft.com/office/drawing/2014/main" id="{42651B7F-ECB9-9C1A-C042-F4284F727899}"/>
+                <a16:creationId xmlns:a16="http://schemas.microsoft.com/office/drawing/2014/main" id="{E59D4712-FC7D-A15A-7F8D-989D9DF811F2}"/>
               </a:ext>
             </a:extLst>
           </p:cNvPr>
-          <p:cNvSpPr txBox="1">
-            <a:spLocks noGrp="1"/>
-          </p:cNvSpPr>
-          <p:nvPr>
-            <p:ph type="body" idx="1"/>
-          </p:nvPr>
+          <p:cNvSpPr/>
+          <p:nvPr/>
         </p:nvSpPr>
         <p:spPr>
           <a:xfrm>
-            <a:off x="33872" y="4793675"/>
-            <a:ext cx="8520600" cy="249606"/>
+            <a:off x="1593426" y="3271404"/>
+            <a:ext cx="173182" cy="188349"/>
+          </a:xfrm>
+          <a:prstGeom prst="downArrow">
+            <a:avLst/>
+          </a:prstGeom>
+        </p:spPr>
+        <p:style>
+          <a:lnRef idx="2">
+            <a:schemeClr val="accent1">
+              <a:shade val="15000"/>
+            </a:schemeClr>
+          </a:lnRef>
+          <a:fillRef idx="1">
+            <a:schemeClr val="accent1"/>
+          </a:fillRef>
+          <a:effectRef idx="0">
+            <a:schemeClr val="accent1"/>
+          </a:effectRef>
+          <a:fontRef idx="minor">
+            <a:schemeClr val="lt1"/>
+          </a:fontRef>
+        </p:style>
+        <p:txBody>
+          <a:bodyPr rtlCol="0" anchor="ctr"/>
+          <a:lstStyle/>
+          <a:p>
+            <a:pPr algn="ctr"/>
+            <a:endParaRPr lang="en-US"/>
+          </a:p>
+        </p:txBody>
+      </p:sp>
+      <p:pic>
+        <p:nvPicPr>
+          <p:cNvPr id="11" name="Picture 10">
+            <a:extLst>
+              <a:ext uri="{FF2B5EF4-FFF2-40B4-BE49-F238E27FC236}">
+                <a16:creationId xmlns:a16="http://schemas.microsoft.com/office/drawing/2014/main" id="{7C30AC49-68A2-AEDD-361B-068F4FF3BBFF}"/>
+              </a:ext>
+            </a:extLst>
+          </p:cNvPr>
+          <p:cNvPicPr>
+            <a:picLocks noChangeAspect="1"/>
+          </p:cNvPicPr>
+          <p:nvPr/>
+        </p:nvPicPr>
+        <p:blipFill>
+          <a:blip r:embed="rId4"/>
+          <a:stretch>
+            <a:fillRect/>
+          </a:stretch>
+        </p:blipFill>
+        <p:spPr>
+          <a:xfrm>
+            <a:off x="3121680" y="725716"/>
+            <a:ext cx="2932326" cy="2167899"/>
           </a:xfrm>
           <a:prstGeom prst="rect">
             <a:avLst/>
           </a:prstGeom>
         </p:spPr>
+      </p:pic>
+      <p:pic>
+        <p:nvPicPr>
+          <p:cNvPr id="13" name="Picture 12">
+            <a:extLst>
+              <a:ext uri="{FF2B5EF4-FFF2-40B4-BE49-F238E27FC236}">
+                <a16:creationId xmlns:a16="http://schemas.microsoft.com/office/drawing/2014/main" id="{22BBE01F-E806-2268-4F65-D03D191032E6}"/>
+              </a:ext>
+            </a:extLst>
+          </p:cNvPr>
+          <p:cNvPicPr>
+            <a:picLocks noChangeAspect="1"/>
+          </p:cNvPicPr>
+          <p:nvPr/>
+        </p:nvPicPr>
+        <p:blipFill>
+          <a:blip r:embed="rId5"/>
+          <a:stretch>
+            <a:fillRect/>
+          </a:stretch>
+        </p:blipFill>
+        <p:spPr>
+          <a:xfrm>
+            <a:off x="3152460" y="3680925"/>
+            <a:ext cx="2794995" cy="1102927"/>
+          </a:xfrm>
+          <a:prstGeom prst="rect">
+            <a:avLst/>
+          </a:prstGeom>
+        </p:spPr>
+      </p:pic>
+      <p:sp>
+        <p:nvSpPr>
+          <p:cNvPr id="14" name="Arrow: Down 13">
+            <a:extLst>
+              <a:ext uri="{FF2B5EF4-FFF2-40B4-BE49-F238E27FC236}">
+                <a16:creationId xmlns:a16="http://schemas.microsoft.com/office/drawing/2014/main" id="{3ACD1E2C-112B-C993-BD8E-AA8985076C9C}"/>
+              </a:ext>
+            </a:extLst>
+          </p:cNvPr>
+          <p:cNvSpPr/>
+          <p:nvPr/>
+        </p:nvSpPr>
+        <p:spPr>
+          <a:xfrm>
+            <a:off x="4530590" y="3293801"/>
+            <a:ext cx="173182" cy="188349"/>
+          </a:xfrm>
+          <a:prstGeom prst="downArrow">
+            <a:avLst/>
+          </a:prstGeom>
+        </p:spPr>
+        <p:style>
+          <a:lnRef idx="2">
+            <a:schemeClr val="accent1">
+              <a:shade val="15000"/>
+            </a:schemeClr>
+          </a:lnRef>
+          <a:fillRef idx="1">
+            <a:schemeClr val="accent1"/>
+          </a:fillRef>
+          <a:effectRef idx="0">
+            <a:schemeClr val="accent1"/>
+          </a:effectRef>
+          <a:fontRef idx="minor">
+            <a:schemeClr val="lt1"/>
+          </a:fontRef>
+        </p:style>
         <p:txBody>
-          <a:bodyPr spcFirstLastPara="1" wrap="square" lIns="91425" tIns="91425" rIns="91425" bIns="91425" anchor="ctr" anchorCtr="0">
-            <a:noAutofit/>
-          </a:bodyPr>
+          <a:bodyPr rtlCol="0" anchor="ctr"/>
           <a:lstStyle/>
           <a:p>
-            <a:pPr marL="0" lvl="0" indent="0" algn="l" rtl="0">
-              <a:spcBef>
-                <a:spcPts val="0"/>
-              </a:spcBef>
-              <a:spcAft>
-                <a:spcPts val="1200"/>
-              </a:spcAft>
-              <a:buNone/>
-            </a:pPr>
-            <a:r>
-              <a:rPr lang="en" sz="1400" dirty="0"/>
-              <a:t>			</a:t>
-            </a:r>
-            <a:r>
-              <a:rPr lang="en" sz="1400" dirty="0">
-                <a:highlight>
-                  <a:srgbClr val="FFFF00"/>
-                </a:highlight>
-              </a:rPr>
-              <a:t>AUC of 0.97 indicated excellent discrimination</a:t>
-            </a:r>
-            <a:endParaRPr sz="1400" dirty="0">
-              <a:highlight>
-                <a:srgbClr val="FFFF00"/>
-              </a:highlight>
-            </a:endParaRPr>
+            <a:pPr algn="ctr"/>
+            <a:endParaRPr lang="en-US"/>
           </a:p>
         </p:txBody>
       </p:sp>
+      <p:pic>
+        <p:nvPicPr>
+          <p:cNvPr id="16" name="Picture 15">
+            <a:extLst>
+              <a:ext uri="{FF2B5EF4-FFF2-40B4-BE49-F238E27FC236}">
+                <a16:creationId xmlns:a16="http://schemas.microsoft.com/office/drawing/2014/main" id="{3F05E8DA-A379-7DB8-9CB5-AEF5A8251F27}"/>
+              </a:ext>
+            </a:extLst>
+          </p:cNvPr>
+          <p:cNvPicPr>
+            <a:picLocks noChangeAspect="1"/>
+          </p:cNvPicPr>
+          <p:nvPr/>
+        </p:nvPicPr>
+        <p:blipFill>
+          <a:blip r:embed="rId6"/>
+          <a:stretch>
+            <a:fillRect/>
+          </a:stretch>
+        </p:blipFill>
+        <p:spPr>
+          <a:xfrm>
+            <a:off x="6270886" y="711862"/>
+            <a:ext cx="2873114" cy="2167898"/>
+          </a:xfrm>
+          <a:prstGeom prst="rect">
+            <a:avLst/>
+          </a:prstGeom>
+        </p:spPr>
+      </p:pic>
+      <p:sp>
+        <p:nvSpPr>
+          <p:cNvPr id="17" name="Arrow: Down 16">
+            <a:extLst>
+              <a:ext uri="{FF2B5EF4-FFF2-40B4-BE49-F238E27FC236}">
+                <a16:creationId xmlns:a16="http://schemas.microsoft.com/office/drawing/2014/main" id="{98DD8BF0-19CA-DDD2-5C3E-29F666A03FAD}"/>
+              </a:ext>
+            </a:extLst>
+          </p:cNvPr>
+          <p:cNvSpPr/>
+          <p:nvPr/>
+        </p:nvSpPr>
+        <p:spPr>
+          <a:xfrm>
+            <a:off x="7855681" y="3293801"/>
+            <a:ext cx="173182" cy="188349"/>
+          </a:xfrm>
+          <a:prstGeom prst="downArrow">
+            <a:avLst/>
+          </a:prstGeom>
+        </p:spPr>
+        <p:style>
+          <a:lnRef idx="2">
+            <a:schemeClr val="accent1">
+              <a:shade val="15000"/>
+            </a:schemeClr>
+          </a:lnRef>
+          <a:fillRef idx="1">
+            <a:schemeClr val="accent1"/>
+          </a:fillRef>
+          <a:effectRef idx="0">
+            <a:schemeClr val="accent1"/>
+          </a:effectRef>
+          <a:fontRef idx="minor">
+            <a:schemeClr val="lt1"/>
+          </a:fontRef>
+        </p:style>
+        <p:txBody>
+          <a:bodyPr rtlCol="0" anchor="ctr"/>
+          <a:lstStyle/>
+          <a:p>
+            <a:pPr algn="ctr"/>
+            <a:endParaRPr lang="en-US"/>
+          </a:p>
+        </p:txBody>
+      </p:sp>
+      <p:pic>
+        <p:nvPicPr>
+          <p:cNvPr id="19" name="Picture 18">
+            <a:extLst>
+              <a:ext uri="{FF2B5EF4-FFF2-40B4-BE49-F238E27FC236}">
+                <a16:creationId xmlns:a16="http://schemas.microsoft.com/office/drawing/2014/main" id="{EF247480-5C38-02FA-614D-1564AF02345B}"/>
+              </a:ext>
+            </a:extLst>
+          </p:cNvPr>
+          <p:cNvPicPr>
+            <a:picLocks noChangeAspect="1"/>
+          </p:cNvPicPr>
+          <p:nvPr/>
+        </p:nvPicPr>
+        <p:blipFill>
+          <a:blip r:embed="rId7"/>
+          <a:stretch>
+            <a:fillRect/>
+          </a:stretch>
+        </p:blipFill>
+        <p:spPr>
+          <a:xfrm>
+            <a:off x="6137564" y="3680925"/>
+            <a:ext cx="2987687" cy="1039272"/>
+          </a:xfrm>
+          <a:prstGeom prst="rect">
+            <a:avLst/>
+          </a:prstGeom>
+        </p:spPr>
+      </p:pic>
     </p:spTree>
     <p:extLst>
       <p:ext uri="{BB962C8B-B14F-4D97-AF65-F5344CB8AC3E}">
-        <p14:creationId xmlns:p14="http://schemas.microsoft.com/office/powerpoint/2010/main" val="474055355"/>
+        <p14:creationId xmlns:p14="http://schemas.microsoft.com/office/powerpoint/2010/main" val="4142492293"/>
       </p:ext>
     </p:extLst>
   </p:cSld>

</xml_diff>

<commit_message>
fixed ppt removed cancer dataset Final Project CS 4662. Harish L April 27 2025
</commit_message>
<xml_diff>
--- a/Reports/CS 4662 Heart Failure Presentation.pptx
+++ b/Reports/CS 4662 Heart Failure Presentation.pptx
@@ -7638,7 +7638,7 @@
                 <a:cs typeface="Arial"/>
                 <a:sym typeface="Arial"/>
               </a:rPr>
-              <a:t>“Cancer dataset includes features such as radius mean, texture mean, etc., depicted in Figure 1."</a:t>
+              <a:t>“HeartFailure dataset includes features  depicted in Figure 1."</a:t>
             </a:r>
             <a:endParaRPr dirty="0">
               <a:latin typeface="Arial"/>
@@ -7881,34 +7881,6 @@
           </a:p>
         </p:txBody>
       </p:sp>
-      <p:pic>
-        <p:nvPicPr>
-          <p:cNvPr id="73" name="Google Shape;73;p15"/>
-          <p:cNvPicPr preferRelativeResize="0"/>
-          <p:nvPr/>
-        </p:nvPicPr>
-        <p:blipFill>
-          <a:blip r:embed="rId3">
-            <a:alphaModFix/>
-          </a:blip>
-          <a:stretch>
-            <a:fillRect/>
-          </a:stretch>
-        </p:blipFill>
-        <p:spPr>
-          <a:xfrm>
-            <a:off x="1464075" y="1391049"/>
-            <a:ext cx="6450224" cy="1593975"/>
-          </a:xfrm>
-          <a:prstGeom prst="rect">
-            <a:avLst/>
-          </a:prstGeom>
-          <a:noFill/>
-          <a:ln>
-            <a:noFill/>
-          </a:ln>
-        </p:spPr>
-      </p:pic>
       <p:sp>
         <p:nvSpPr>
           <p:cNvPr id="74" name="Google Shape;74;p15"/>
@@ -7956,6 +7928,72 @@
           </a:p>
         </p:txBody>
       </p:sp>
+      <p:cxnSp>
+        <p:nvCxnSpPr>
+          <p:cNvPr id="11" name="Straight Connector 10">
+            <a:extLst>
+              <a:ext uri="{FF2B5EF4-FFF2-40B4-BE49-F238E27FC236}">
+                <a16:creationId xmlns:a16="http://schemas.microsoft.com/office/drawing/2014/main" id="{05451EC8-AEA9-461D-EB88-DCBB20513422}"/>
+              </a:ext>
+            </a:extLst>
+          </p:cNvPr>
+          <p:cNvCxnSpPr/>
+          <p:nvPr/>
+        </p:nvCxnSpPr>
+        <p:spPr>
+          <a:xfrm>
+            <a:off x="3200400" y="457200"/>
+            <a:ext cx="727364" cy="339436"/>
+          </a:xfrm>
+          <a:prstGeom prst="line">
+            <a:avLst/>
+          </a:prstGeom>
+        </p:spPr>
+        <p:style>
+          <a:lnRef idx="1">
+            <a:schemeClr val="accent1"/>
+          </a:lnRef>
+          <a:fillRef idx="0">
+            <a:schemeClr val="accent1"/>
+          </a:fillRef>
+          <a:effectRef idx="0">
+            <a:schemeClr val="accent1"/>
+          </a:effectRef>
+          <a:fontRef idx="minor">
+            <a:schemeClr val="tx1"/>
+          </a:fontRef>
+        </p:style>
+      </p:cxnSp>
+      <p:pic>
+        <p:nvPicPr>
+          <p:cNvPr id="13" name="Picture 12">
+            <a:extLst>
+              <a:ext uri="{FF2B5EF4-FFF2-40B4-BE49-F238E27FC236}">
+                <a16:creationId xmlns:a16="http://schemas.microsoft.com/office/drawing/2014/main" id="{7F37CAAA-7C7A-CBA9-25A0-FB6DBF973C46}"/>
+              </a:ext>
+            </a:extLst>
+          </p:cNvPr>
+          <p:cNvPicPr>
+            <a:picLocks noChangeAspect="1"/>
+          </p:cNvPicPr>
+          <p:nvPr/>
+        </p:nvPicPr>
+        <p:blipFill>
+          <a:blip r:embed="rId3"/>
+          <a:stretch>
+            <a:fillRect/>
+          </a:stretch>
+        </p:blipFill>
+        <p:spPr>
+          <a:xfrm>
+            <a:off x="28123" y="1453395"/>
+            <a:ext cx="9144000" cy="2075588"/>
+          </a:xfrm>
+          <a:prstGeom prst="rect">
+            <a:avLst/>
+          </a:prstGeom>
+        </p:spPr>
+      </p:pic>
     </p:spTree>
   </p:cSld>
   <p:clrMapOvr>

</xml_diff>